<commit_message>
After amanda strikes again
After amanda strikes
</commit_message>
<xml_diff>
--- a/images/figs.pptx
+++ b/images/figs.pptx
@@ -5,7 +5,7 @@
     <p:sldMasterId id="2147483648" r:id="rId1"/>
   </p:sldMasterIdLst>
   <p:notesMasterIdLst>
-    <p:notesMasterId r:id="rId8"/>
+    <p:notesMasterId r:id="rId11"/>
   </p:notesMasterIdLst>
   <p:sldIdLst>
     <p:sldId id="256" r:id="rId2"/>
@@ -13,7 +13,10 @@
     <p:sldId id="258" r:id="rId4"/>
     <p:sldId id="259" r:id="rId5"/>
     <p:sldId id="260" r:id="rId6"/>
-    <p:sldId id="261" r:id="rId7"/>
+    <p:sldId id="264" r:id="rId7"/>
+    <p:sldId id="261" r:id="rId8"/>
+    <p:sldId id="262" r:id="rId9"/>
+    <p:sldId id="263" r:id="rId10"/>
   </p:sldIdLst>
   <p:sldSz cx="12192000" cy="6858000"/>
   <p:notesSz cx="6858000" cy="9144000"/>
@@ -123,7 +126,7 @@
 <file path=ppt/revisionInfo.xml><?xml version="1.0" encoding="utf-8"?>
 <p1510:revInfo xmlns:a="http://schemas.openxmlformats.org/drawingml/2006/main" xmlns:r="http://schemas.openxmlformats.org/officeDocument/2006/relationships" xmlns:p1510="http://schemas.microsoft.com/office/powerpoint/2015/10/main">
   <p1510:revLst>
-    <p1510:client id="{014D5CA4-D295-7548-8FEC-3B23D05797E2}" v="9" dt="2026-01-09T23:23:17.965"/>
+    <p1510:client id="{F5AEAB20-53C7-E547-B110-CA366EDAD81F}" v="157" dt="2026-01-27T23:22:47.589"/>
   </p1510:revLst>
 </p1510:revInfo>
 </file>
@@ -133,7 +136,7 @@
   <pc:docChgLst>
     <pc:chgData name="Viswa Viswanathan" userId="eeb7c4cd-bdfa-4397-b7a5-e8e212654fbb" providerId="ADAL" clId="{455DE2C3-A8E5-5974-AAE2-AD9291CAFE23}"/>
     <pc:docChg chg="undo custSel addSld modSld">
-      <pc:chgData name="Viswa Viswanathan" userId="eeb7c4cd-bdfa-4397-b7a5-e8e212654fbb" providerId="ADAL" clId="{455DE2C3-A8E5-5974-AAE2-AD9291CAFE23}" dt="2026-01-09T23:32:59.957" v="339" actId="478"/>
+      <pc:chgData name="Viswa Viswanathan" userId="eeb7c4cd-bdfa-4397-b7a5-e8e212654fbb" providerId="ADAL" clId="{455DE2C3-A8E5-5974-AAE2-AD9291CAFE23}" dt="2026-01-12T17:01:29.882" v="342"/>
       <pc:docMkLst>
         <pc:docMk/>
       </pc:docMkLst>
@@ -143,52 +146,12 @@
           <pc:docMk/>
           <pc:sldMk cId="609444070" sldId="258"/>
         </pc:sldMkLst>
-        <pc:spChg chg="del">
-          <ac:chgData name="Viswa Viswanathan" userId="eeb7c4cd-bdfa-4397-b7a5-e8e212654fbb" providerId="ADAL" clId="{455DE2C3-A8E5-5974-AAE2-AD9291CAFE23}" dt="2026-01-09T12:20:08.816" v="1" actId="478"/>
-          <ac:spMkLst>
-            <pc:docMk/>
-            <pc:sldMk cId="609444070" sldId="258"/>
-            <ac:spMk id="2" creationId="{CB89F9C0-E97E-70A4-A2FA-DE82F015AD2E}"/>
-          </ac:spMkLst>
-        </pc:spChg>
-        <pc:spChg chg="del">
-          <ac:chgData name="Viswa Viswanathan" userId="eeb7c4cd-bdfa-4397-b7a5-e8e212654fbb" providerId="ADAL" clId="{455DE2C3-A8E5-5974-AAE2-AD9291CAFE23}" dt="2026-01-09T12:20:08.816" v="1" actId="478"/>
-          <ac:spMkLst>
-            <pc:docMk/>
-            <pc:sldMk cId="609444070" sldId="258"/>
-            <ac:spMk id="3" creationId="{3EBC0555-4D8A-C937-A9C2-4E00A3D66AA1}"/>
-          </ac:spMkLst>
-        </pc:spChg>
         <pc:spChg chg="mod">
           <ac:chgData name="Viswa Viswanathan" userId="eeb7c4cd-bdfa-4397-b7a5-e8e212654fbb" providerId="ADAL" clId="{455DE2C3-A8E5-5974-AAE2-AD9291CAFE23}" dt="2026-01-09T12:25:02.487" v="75"/>
           <ac:spMkLst>
             <pc:docMk/>
             <pc:sldMk cId="609444070" sldId="258"/>
             <ac:spMk id="5" creationId="{B172C85B-8D97-57CA-309D-A99979E46292}"/>
-          </ac:spMkLst>
-        </pc:spChg>
-        <pc:spChg chg="del mod">
-          <ac:chgData name="Viswa Viswanathan" userId="eeb7c4cd-bdfa-4397-b7a5-e8e212654fbb" providerId="ADAL" clId="{455DE2C3-A8E5-5974-AAE2-AD9291CAFE23}" dt="2026-01-09T12:24:26.637" v="67" actId="478"/>
-          <ac:spMkLst>
-            <pc:docMk/>
-            <pc:sldMk cId="609444070" sldId="258"/>
-            <ac:spMk id="6" creationId="{B15080B6-48D4-F9DC-753D-7ECD2C4A5B7E}"/>
-          </ac:spMkLst>
-        </pc:spChg>
-        <pc:spChg chg="del mod">
-          <ac:chgData name="Viswa Viswanathan" userId="eeb7c4cd-bdfa-4397-b7a5-e8e212654fbb" providerId="ADAL" clId="{455DE2C3-A8E5-5974-AAE2-AD9291CAFE23}" dt="2026-01-09T12:24:31.732" v="68" actId="478"/>
-          <ac:spMkLst>
-            <pc:docMk/>
-            <pc:sldMk cId="609444070" sldId="258"/>
-            <ac:spMk id="7" creationId="{07DB8F16-0731-0965-59CA-172899E5D9A0}"/>
-          </ac:spMkLst>
-        </pc:spChg>
-        <pc:spChg chg="del mod">
-          <ac:chgData name="Viswa Viswanathan" userId="eeb7c4cd-bdfa-4397-b7a5-e8e212654fbb" providerId="ADAL" clId="{455DE2C3-A8E5-5974-AAE2-AD9291CAFE23}" dt="2026-01-09T12:24:37.085" v="69" actId="478"/>
-          <ac:spMkLst>
-            <pc:docMk/>
-            <pc:sldMk cId="609444070" sldId="258"/>
-            <ac:spMk id="8" creationId="{7107DA6B-6AA8-E9F6-6C1E-E98550544553}"/>
           </ac:spMkLst>
         </pc:spChg>
         <pc:spChg chg="mod">
@@ -231,30 +194,6 @@
             <ac:spMk id="14" creationId="{C778A9EF-D233-D732-06FE-9DFBC6B877CE}"/>
           </ac:spMkLst>
         </pc:spChg>
-        <pc:spChg chg="mod">
-          <ac:chgData name="Viswa Viswanathan" userId="eeb7c4cd-bdfa-4397-b7a5-e8e212654fbb" providerId="ADAL" clId="{455DE2C3-A8E5-5974-AAE2-AD9291CAFE23}" dt="2026-01-09T14:57:24.091" v="191"/>
-          <ac:spMkLst>
-            <pc:docMk/>
-            <pc:sldMk cId="609444070" sldId="258"/>
-            <ac:spMk id="16" creationId="{345B4E63-2393-AB80-F5CF-1CC61EC291CE}"/>
-          </ac:spMkLst>
-        </pc:spChg>
-        <pc:spChg chg="mod">
-          <ac:chgData name="Viswa Viswanathan" userId="eeb7c4cd-bdfa-4397-b7a5-e8e212654fbb" providerId="ADAL" clId="{455DE2C3-A8E5-5974-AAE2-AD9291CAFE23}" dt="2026-01-09T14:57:24.091" v="191"/>
-          <ac:spMkLst>
-            <pc:docMk/>
-            <pc:sldMk cId="609444070" sldId="258"/>
-            <ac:spMk id="17" creationId="{306A9C9C-822F-01AA-0ABC-B6D7501EEEF3}"/>
-          </ac:spMkLst>
-        </pc:spChg>
-        <pc:spChg chg="mod">
-          <ac:chgData name="Viswa Viswanathan" userId="eeb7c4cd-bdfa-4397-b7a5-e8e212654fbb" providerId="ADAL" clId="{455DE2C3-A8E5-5974-AAE2-AD9291CAFE23}" dt="2026-01-09T14:57:24.091" v="191"/>
-          <ac:spMkLst>
-            <pc:docMk/>
-            <pc:sldMk cId="609444070" sldId="258"/>
-            <ac:spMk id="18" creationId="{AE24B4E3-10C1-E372-8A28-5445D066F8CE}"/>
-          </ac:spMkLst>
-        </pc:spChg>
         <pc:grpChg chg="add mod">
           <ac:chgData name="Viswa Viswanathan" userId="eeb7c4cd-bdfa-4397-b7a5-e8e212654fbb" providerId="ADAL" clId="{455DE2C3-A8E5-5974-AAE2-AD9291CAFE23}" dt="2026-01-09T14:49:36.026" v="103" actId="1076"/>
           <ac:grpSpMkLst>
@@ -269,14 +208,6 @@
             <pc:docMk/>
             <pc:sldMk cId="609444070" sldId="258"/>
             <ac:grpSpMk id="11" creationId="{F62253B4-A4F5-CEE5-D7D3-1E36CE0908D8}"/>
-          </ac:grpSpMkLst>
-        </pc:grpChg>
-        <pc:grpChg chg="add del mod">
-          <ac:chgData name="Viswa Viswanathan" userId="eeb7c4cd-bdfa-4397-b7a5-e8e212654fbb" providerId="ADAL" clId="{455DE2C3-A8E5-5974-AAE2-AD9291CAFE23}" dt="2026-01-09T14:57:25.427" v="192" actId="21"/>
-          <ac:grpSpMkLst>
-            <pc:docMk/>
-            <pc:sldMk cId="609444070" sldId="258"/>
-            <ac:grpSpMk id="15" creationId="{DB7B6285-BF1D-3E92-C2A0-252001D771A1}"/>
           </ac:grpSpMkLst>
         </pc:grpChg>
       </pc:sldChg>
@@ -310,14 +241,6 @@
             <ac:spMk id="10" creationId="{4E322EA4-78C7-E42A-FA8D-3AD8F7D1D7A1}"/>
           </ac:spMkLst>
         </pc:spChg>
-        <pc:grpChg chg="del">
-          <ac:chgData name="Viswa Viswanathan" userId="eeb7c4cd-bdfa-4397-b7a5-e8e212654fbb" providerId="ADAL" clId="{455DE2C3-A8E5-5974-AAE2-AD9291CAFE23}" dt="2026-01-09T14:57:35.430" v="194" actId="478"/>
-          <ac:grpSpMkLst>
-            <pc:docMk/>
-            <pc:sldMk cId="3480885725" sldId="259"/>
-            <ac:grpSpMk id="11" creationId="{89584DD1-DEDC-5A68-1654-C7C0E1B46B35}"/>
-          </ac:grpSpMkLst>
-        </pc:grpChg>
       </pc:sldChg>
       <pc:sldChg chg="addSp delSp modSp new mod">
         <pc:chgData name="Viswa Viswanathan" userId="eeb7c4cd-bdfa-4397-b7a5-e8e212654fbb" providerId="ADAL" clId="{455DE2C3-A8E5-5974-AAE2-AD9291CAFE23}" dt="2026-01-09T17:36:45.972" v="275" actId="732"/>
@@ -325,22 +248,6 @@
           <pc:docMk/>
           <pc:sldMk cId="2369186413" sldId="260"/>
         </pc:sldMkLst>
-        <pc:spChg chg="del mod">
-          <ac:chgData name="Viswa Viswanathan" userId="eeb7c4cd-bdfa-4397-b7a5-e8e212654fbb" providerId="ADAL" clId="{455DE2C3-A8E5-5974-AAE2-AD9291CAFE23}" dt="2026-01-09T17:35:26.242" v="267" actId="478"/>
-          <ac:spMkLst>
-            <pc:docMk/>
-            <pc:sldMk cId="2369186413" sldId="260"/>
-            <ac:spMk id="2" creationId="{F369824E-4956-2AC1-2910-34E3E31C8F0D}"/>
-          </ac:spMkLst>
-        </pc:spChg>
-        <pc:spChg chg="del">
-          <ac:chgData name="Viswa Viswanathan" userId="eeb7c4cd-bdfa-4397-b7a5-e8e212654fbb" providerId="ADAL" clId="{455DE2C3-A8E5-5974-AAE2-AD9291CAFE23}" dt="2026-01-09T17:35:26.242" v="267" actId="478"/>
-          <ac:spMkLst>
-            <pc:docMk/>
-            <pc:sldMk cId="2369186413" sldId="260"/>
-            <ac:spMk id="3" creationId="{1DD7F668-9A37-C0EE-61DF-F899656FB563}"/>
-          </ac:spMkLst>
-        </pc:spChg>
         <pc:picChg chg="add mod modCrop">
           <ac:chgData name="Viswa Viswanathan" userId="eeb7c4cd-bdfa-4397-b7a5-e8e212654fbb" providerId="ADAL" clId="{455DE2C3-A8E5-5974-AAE2-AD9291CAFE23}" dt="2026-01-09T17:36:45.972" v="275" actId="732"/>
           <ac:picMkLst>
@@ -351,49 +258,17 @@
         </pc:picChg>
       </pc:sldChg>
       <pc:sldChg chg="addSp delSp modSp new mod">
-        <pc:chgData name="Viswa Viswanathan" userId="eeb7c4cd-bdfa-4397-b7a5-e8e212654fbb" providerId="ADAL" clId="{455DE2C3-A8E5-5974-AAE2-AD9291CAFE23}" dt="2026-01-09T23:32:59.957" v="339" actId="478"/>
+        <pc:chgData name="Viswa Viswanathan" userId="eeb7c4cd-bdfa-4397-b7a5-e8e212654fbb" providerId="ADAL" clId="{455DE2C3-A8E5-5974-AAE2-AD9291CAFE23}" dt="2026-01-12T17:01:29.882" v="342"/>
         <pc:sldMkLst>
           <pc:docMk/>
           <pc:sldMk cId="497765789" sldId="261"/>
         </pc:sldMkLst>
-        <pc:grpChg chg="add del">
-          <ac:chgData name="Viswa Viswanathan" userId="eeb7c4cd-bdfa-4397-b7a5-e8e212654fbb" providerId="ADAL" clId="{455DE2C3-A8E5-5974-AAE2-AD9291CAFE23}" dt="2026-01-09T23:32:59.957" v="339" actId="478"/>
-          <ac:grpSpMkLst>
-            <pc:docMk/>
-            <pc:sldMk cId="497765789" sldId="261"/>
-            <ac:grpSpMk id="9" creationId="{AE64A4B6-94B9-57C3-8073-E9BB864CD554}"/>
-          </ac:grpSpMkLst>
-        </pc:grpChg>
-        <pc:picChg chg="add del mod">
-          <ac:chgData name="Viswa Viswanathan" userId="eeb7c4cd-bdfa-4397-b7a5-e8e212654fbb" providerId="ADAL" clId="{455DE2C3-A8E5-5974-AAE2-AD9291CAFE23}" dt="2026-01-09T23:22:04.476" v="284" actId="478"/>
+        <pc:picChg chg="add mod">
+          <ac:chgData name="Viswa Viswanathan" userId="eeb7c4cd-bdfa-4397-b7a5-e8e212654fbb" providerId="ADAL" clId="{455DE2C3-A8E5-5974-AAE2-AD9291CAFE23}" dt="2026-01-12T17:01:29.882" v="342"/>
           <ac:picMkLst>
             <pc:docMk/>
             <pc:sldMk cId="497765789" sldId="261"/>
-            <ac:picMk id="3" creationId="{EDB893C5-6755-0371-65FB-756CCEF5DB88}"/>
-          </ac:picMkLst>
-        </pc:picChg>
-        <pc:picChg chg="add del mod">
-          <ac:chgData name="Viswa Viswanathan" userId="eeb7c4cd-bdfa-4397-b7a5-e8e212654fbb" providerId="ADAL" clId="{455DE2C3-A8E5-5974-AAE2-AD9291CAFE23}" dt="2026-01-09T23:22:04.476" v="284" actId="478"/>
-          <ac:picMkLst>
-            <pc:docMk/>
-            <pc:sldMk cId="497765789" sldId="261"/>
-            <ac:picMk id="4" creationId="{20761058-BE53-6815-41F6-8E94C4F9BB60}"/>
-          </ac:picMkLst>
-        </pc:picChg>
-        <pc:picChg chg="add del mod topLvl modCrop">
-          <ac:chgData name="Viswa Viswanathan" userId="eeb7c4cd-bdfa-4397-b7a5-e8e212654fbb" providerId="ADAL" clId="{455DE2C3-A8E5-5974-AAE2-AD9291CAFE23}" dt="2026-01-09T23:32:59.957" v="339" actId="478"/>
-          <ac:picMkLst>
-            <pc:docMk/>
-            <pc:sldMk cId="497765789" sldId="261"/>
-            <ac:picMk id="6" creationId="{71FE3DFC-5B10-BBBB-0571-95DD178376F8}"/>
-          </ac:picMkLst>
-        </pc:picChg>
-        <pc:picChg chg="add del mod topLvl modCrop">
-          <ac:chgData name="Viswa Viswanathan" userId="eeb7c4cd-bdfa-4397-b7a5-e8e212654fbb" providerId="ADAL" clId="{455DE2C3-A8E5-5974-AAE2-AD9291CAFE23}" dt="2026-01-09T23:32:59.957" v="339" actId="478"/>
-          <ac:picMkLst>
-            <pc:docMk/>
-            <pc:sldMk cId="497765789" sldId="261"/>
-            <ac:picMk id="8" creationId="{1C7AF582-E18F-90C5-D4DD-2F6C40A3AF8A}"/>
+            <ac:picMk id="12" creationId="{0B15638C-1110-61AB-0820-BA0F66D78E49}"/>
           </ac:picMkLst>
         </pc:picChg>
       </pc:sldChg>
@@ -401,8 +276,8 @@
   </pc:docChgLst>
   <pc:docChgLst>
     <pc:chgData name="Viswa Viswanathan" userId="eeb7c4cd-bdfa-4397-b7a5-e8e212654fbb" providerId="ADAL" clId="{789CB485-5F3F-5DB7-AA3E-86007C2BD59C}"/>
-    <pc:docChg chg="custSel addSld modSld">
-      <pc:chgData name="Viswa Viswanathan" userId="eeb7c4cd-bdfa-4397-b7a5-e8e212654fbb" providerId="ADAL" clId="{789CB485-5F3F-5DB7-AA3E-86007C2BD59C}" dt="2026-01-06T17:10:50.694" v="49" actId="1076"/>
+    <pc:docChg chg="undo custSel addSld modSld">
+      <pc:chgData name="Viswa Viswanathan" userId="eeb7c4cd-bdfa-4397-b7a5-e8e212654fbb" providerId="ADAL" clId="{789CB485-5F3F-5DB7-AA3E-86007C2BD59C}" dt="2026-01-27T23:23:20.327" v="607" actId="1038"/>
       <pc:docMkLst>
         <pc:docMk/>
       </pc:docMkLst>
@@ -461,6 +336,275 @@
           </ac:grpSpMkLst>
         </pc:grpChg>
       </pc:sldChg>
+      <pc:sldChg chg="addSp delSp modSp new mod">
+        <pc:chgData name="Viswa Viswanathan" userId="eeb7c4cd-bdfa-4397-b7a5-e8e212654fbb" providerId="ADAL" clId="{789CB485-5F3F-5DB7-AA3E-86007C2BD59C}" dt="2026-01-27T23:23:20.327" v="607" actId="1038"/>
+        <pc:sldMkLst>
+          <pc:docMk/>
+          <pc:sldMk cId="911215209" sldId="262"/>
+        </pc:sldMkLst>
+        <pc:spChg chg="add mod">
+          <ac:chgData name="Viswa Viswanathan" userId="eeb7c4cd-bdfa-4397-b7a5-e8e212654fbb" providerId="ADAL" clId="{789CB485-5F3F-5DB7-AA3E-86007C2BD59C}" dt="2026-01-23T23:23:18.709" v="159" actId="20577"/>
+          <ac:spMkLst>
+            <pc:docMk/>
+            <pc:sldMk cId="911215209" sldId="262"/>
+            <ac:spMk id="2" creationId="{0A3E5002-7B6B-E02E-628E-90D766B6B000}"/>
+          </ac:spMkLst>
+        </pc:spChg>
+        <pc:spChg chg="add mod">
+          <ac:chgData name="Viswa Viswanathan" userId="eeb7c4cd-bdfa-4397-b7a5-e8e212654fbb" providerId="ADAL" clId="{789CB485-5F3F-5DB7-AA3E-86007C2BD59C}" dt="2026-01-23T23:22:23.455" v="124" actId="12789"/>
+          <ac:spMkLst>
+            <pc:docMk/>
+            <pc:sldMk cId="911215209" sldId="262"/>
+            <ac:spMk id="3" creationId="{A01A5C40-7FF4-F412-513F-365DD14DAA63}"/>
+          </ac:spMkLst>
+        </pc:spChg>
+        <pc:spChg chg="add mod">
+          <ac:chgData name="Viswa Viswanathan" userId="eeb7c4cd-bdfa-4397-b7a5-e8e212654fbb" providerId="ADAL" clId="{789CB485-5F3F-5DB7-AA3E-86007C2BD59C}" dt="2026-01-23T23:22:52.977" v="137" actId="1037"/>
+          <ac:spMkLst>
+            <pc:docMk/>
+            <pc:sldMk cId="911215209" sldId="262"/>
+            <ac:spMk id="4" creationId="{2476DD39-9FED-DADF-4379-9DE2E87041E0}"/>
+          </ac:spMkLst>
+        </pc:spChg>
+        <pc:spChg chg="mod">
+          <ac:chgData name="Viswa Viswanathan" userId="eeb7c4cd-bdfa-4397-b7a5-e8e212654fbb" providerId="ADAL" clId="{789CB485-5F3F-5DB7-AA3E-86007C2BD59C}" dt="2026-01-23T23:42:46.944" v="406" actId="20577"/>
+          <ac:spMkLst>
+            <pc:docMk/>
+            <pc:sldMk cId="911215209" sldId="262"/>
+            <ac:spMk id="15" creationId="{C7551B2C-1AA9-7E38-DD98-FDAADE8941B1}"/>
+          </ac:spMkLst>
+        </pc:spChg>
+        <pc:spChg chg="mod">
+          <ac:chgData name="Viswa Viswanathan" userId="eeb7c4cd-bdfa-4397-b7a5-e8e212654fbb" providerId="ADAL" clId="{789CB485-5F3F-5DB7-AA3E-86007C2BD59C}" dt="2026-01-23T23:35:54.897" v="335" actId="1036"/>
+          <ac:spMkLst>
+            <pc:docMk/>
+            <pc:sldMk cId="911215209" sldId="262"/>
+            <ac:spMk id="17" creationId="{7E5338C1-7C34-0A28-59B0-12735D42A3EF}"/>
+          </ac:spMkLst>
+        </pc:spChg>
+        <pc:spChg chg="add mod">
+          <ac:chgData name="Viswa Viswanathan" userId="eeb7c4cd-bdfa-4397-b7a5-e8e212654fbb" providerId="ADAL" clId="{789CB485-5F3F-5DB7-AA3E-86007C2BD59C}" dt="2026-01-23T23:36:21.602" v="373" actId="1076"/>
+          <ac:spMkLst>
+            <pc:docMk/>
+            <pc:sldMk cId="911215209" sldId="262"/>
+            <ac:spMk id="21" creationId="{2894E016-1DED-8934-5200-E9E093A7E0BC}"/>
+          </ac:spMkLst>
+        </pc:spChg>
+        <pc:spChg chg="mod">
+          <ac:chgData name="Viswa Viswanathan" userId="eeb7c4cd-bdfa-4397-b7a5-e8e212654fbb" providerId="ADAL" clId="{789CB485-5F3F-5DB7-AA3E-86007C2BD59C}" dt="2026-01-27T23:22:47.589" v="526" actId="20577"/>
+          <ac:spMkLst>
+            <pc:docMk/>
+            <pc:sldMk cId="911215209" sldId="262"/>
+            <ac:spMk id="23" creationId="{108CA430-570E-D900-4294-58E99DC0CA5F}"/>
+          </ac:spMkLst>
+        </pc:spChg>
+        <pc:spChg chg="mod">
+          <ac:chgData name="Viswa Viswanathan" userId="eeb7c4cd-bdfa-4397-b7a5-e8e212654fbb" providerId="ADAL" clId="{789CB485-5F3F-5DB7-AA3E-86007C2BD59C}" dt="2026-01-27T23:22:47.589" v="526" actId="20577"/>
+          <ac:spMkLst>
+            <pc:docMk/>
+            <pc:sldMk cId="911215209" sldId="262"/>
+            <ac:spMk id="24" creationId="{AF17F315-0772-B4CF-DECC-8C2B4727AFF6}"/>
+          </ac:spMkLst>
+        </pc:spChg>
+        <pc:spChg chg="add mod">
+          <ac:chgData name="Viswa Viswanathan" userId="eeb7c4cd-bdfa-4397-b7a5-e8e212654fbb" providerId="ADAL" clId="{789CB485-5F3F-5DB7-AA3E-86007C2BD59C}" dt="2026-01-27T23:22:59.775" v="584" actId="1037"/>
+          <ac:spMkLst>
+            <pc:docMk/>
+            <pc:sldMk cId="911215209" sldId="262"/>
+            <ac:spMk id="27" creationId="{7F07CC57-8E13-7016-C90F-02EBF5249DB9}"/>
+          </ac:spMkLst>
+        </pc:spChg>
+        <pc:grpChg chg="add mod">
+          <ac:chgData name="Viswa Viswanathan" userId="eeb7c4cd-bdfa-4397-b7a5-e8e212654fbb" providerId="ADAL" clId="{789CB485-5F3F-5DB7-AA3E-86007C2BD59C}" dt="2026-01-23T23:29:23.480" v="163" actId="1076"/>
+          <ac:grpSpMkLst>
+            <pc:docMk/>
+            <pc:sldMk cId="911215209" sldId="262"/>
+            <ac:grpSpMk id="13" creationId="{A4056F16-7DF2-C97A-6403-6C96D4808F18}"/>
+          </ac:grpSpMkLst>
+        </pc:grpChg>
+        <pc:grpChg chg="add mod">
+          <ac:chgData name="Viswa Viswanathan" userId="eeb7c4cd-bdfa-4397-b7a5-e8e212654fbb" providerId="ADAL" clId="{789CB485-5F3F-5DB7-AA3E-86007C2BD59C}" dt="2026-01-23T23:36:21.602" v="373" actId="1076"/>
+          <ac:grpSpMkLst>
+            <pc:docMk/>
+            <pc:sldMk cId="911215209" sldId="262"/>
+            <ac:grpSpMk id="14" creationId="{A66FB24D-9BAD-3928-3B7C-189E29BB25E4}"/>
+          </ac:grpSpMkLst>
+        </pc:grpChg>
+        <pc:grpChg chg="add mod">
+          <ac:chgData name="Viswa Viswanathan" userId="eeb7c4cd-bdfa-4397-b7a5-e8e212654fbb" providerId="ADAL" clId="{789CB485-5F3F-5DB7-AA3E-86007C2BD59C}" dt="2026-01-27T23:22:47.589" v="526" actId="20577"/>
+          <ac:grpSpMkLst>
+            <pc:docMk/>
+            <pc:sldMk cId="911215209" sldId="262"/>
+            <ac:grpSpMk id="22" creationId="{F47366C1-EC5E-12C4-D6B9-22B078CF8813}"/>
+          </ac:grpSpMkLst>
+        </pc:grpChg>
+        <pc:grpChg chg="add mod">
+          <ac:chgData name="Viswa Viswanathan" userId="eeb7c4cd-bdfa-4397-b7a5-e8e212654fbb" providerId="ADAL" clId="{789CB485-5F3F-5DB7-AA3E-86007C2BD59C}" dt="2026-01-27T23:23:20.327" v="607" actId="1038"/>
+          <ac:grpSpMkLst>
+            <pc:docMk/>
+            <pc:sldMk cId="911215209" sldId="262"/>
+            <ac:grpSpMk id="28" creationId="{E6131264-CD0A-08D7-1D35-652C809C006B}"/>
+          </ac:grpSpMkLst>
+        </pc:grpChg>
+        <pc:grpChg chg="add">
+          <ac:chgData name="Viswa Viswanathan" userId="eeb7c4cd-bdfa-4397-b7a5-e8e212654fbb" providerId="ADAL" clId="{789CB485-5F3F-5DB7-AA3E-86007C2BD59C}" dt="2026-01-27T23:12:46.774" v="507" actId="164"/>
+          <ac:grpSpMkLst>
+            <pc:docMk/>
+            <pc:sldMk cId="911215209" sldId="262"/>
+            <ac:grpSpMk id="30" creationId="{4ABD37B4-9E1F-154D-2392-4C73F07FE41F}"/>
+          </ac:grpSpMkLst>
+        </pc:grpChg>
+        <pc:cxnChg chg="add mod">
+          <ac:chgData name="Viswa Viswanathan" userId="eeb7c4cd-bdfa-4397-b7a5-e8e212654fbb" providerId="ADAL" clId="{789CB485-5F3F-5DB7-AA3E-86007C2BD59C}" dt="2026-01-23T23:22:33.242" v="125" actId="14100"/>
+          <ac:cxnSpMkLst>
+            <pc:docMk/>
+            <pc:sldMk cId="911215209" sldId="262"/>
+            <ac:cxnSpMk id="6" creationId="{355BF273-DE9B-E1D6-6672-CA1B546D8C2E}"/>
+          </ac:cxnSpMkLst>
+        </pc:cxnChg>
+        <pc:cxnChg chg="add mod">
+          <ac:chgData name="Viswa Viswanathan" userId="eeb7c4cd-bdfa-4397-b7a5-e8e212654fbb" providerId="ADAL" clId="{789CB485-5F3F-5DB7-AA3E-86007C2BD59C}" dt="2026-01-23T23:22:48.785" v="134" actId="1037"/>
+          <ac:cxnSpMkLst>
+            <pc:docMk/>
+            <pc:sldMk cId="911215209" sldId="262"/>
+            <ac:cxnSpMk id="8" creationId="{61E6F99B-3A03-6C92-599D-58D7E1685353}"/>
+          </ac:cxnSpMkLst>
+        </pc:cxnChg>
+        <pc:cxnChg chg="mod">
+          <ac:chgData name="Viswa Viswanathan" userId="eeb7c4cd-bdfa-4397-b7a5-e8e212654fbb" providerId="ADAL" clId="{789CB485-5F3F-5DB7-AA3E-86007C2BD59C}" dt="2026-01-23T23:35:41.862" v="305" actId="20577"/>
+          <ac:cxnSpMkLst>
+            <pc:docMk/>
+            <pc:sldMk cId="911215209" sldId="262"/>
+            <ac:cxnSpMk id="18" creationId="{137A6BC3-E0E3-B011-335E-EBAA4F3640DA}"/>
+          </ac:cxnSpMkLst>
+        </pc:cxnChg>
+        <pc:cxnChg chg="mod">
+          <ac:chgData name="Viswa Viswanathan" userId="eeb7c4cd-bdfa-4397-b7a5-e8e212654fbb" providerId="ADAL" clId="{789CB485-5F3F-5DB7-AA3E-86007C2BD59C}" dt="2026-01-23T23:35:41.862" v="305" actId="20577"/>
+          <ac:cxnSpMkLst>
+            <pc:docMk/>
+            <pc:sldMk cId="911215209" sldId="262"/>
+            <ac:cxnSpMk id="19" creationId="{EC6C8ADA-CD46-4F26-1D94-A2F0E9576103}"/>
+          </ac:cxnSpMkLst>
+        </pc:cxnChg>
+        <pc:cxnChg chg="mod">
+          <ac:chgData name="Viswa Viswanathan" userId="eeb7c4cd-bdfa-4397-b7a5-e8e212654fbb" providerId="ADAL" clId="{789CB485-5F3F-5DB7-AA3E-86007C2BD59C}" dt="2026-01-27T23:22:47.589" v="526" actId="20577"/>
+          <ac:cxnSpMkLst>
+            <pc:docMk/>
+            <pc:sldMk cId="911215209" sldId="262"/>
+            <ac:cxnSpMk id="25" creationId="{4D6829DA-4215-60DB-9C36-E4B4EE0E13EA}"/>
+          </ac:cxnSpMkLst>
+        </pc:cxnChg>
+        <pc:cxnChg chg="mod">
+          <ac:chgData name="Viswa Viswanathan" userId="eeb7c4cd-bdfa-4397-b7a5-e8e212654fbb" providerId="ADAL" clId="{789CB485-5F3F-5DB7-AA3E-86007C2BD59C}" dt="2026-01-27T23:22:47.589" v="526" actId="20577"/>
+          <ac:cxnSpMkLst>
+            <pc:docMk/>
+            <pc:sldMk cId="911215209" sldId="262"/>
+            <ac:cxnSpMk id="26" creationId="{EDA9B41D-7F01-8B25-E5B3-51477B0EDB78}"/>
+          </ac:cxnSpMkLst>
+        </pc:cxnChg>
+      </pc:sldChg>
+      <pc:sldChg chg="addSp modSp new mod">
+        <pc:chgData name="Viswa Viswanathan" userId="eeb7c4cd-bdfa-4397-b7a5-e8e212654fbb" providerId="ADAL" clId="{789CB485-5F3F-5DB7-AA3E-86007C2BD59C}" dt="2026-01-25T14:51:15.562" v="438" actId="20577"/>
+        <pc:sldMkLst>
+          <pc:docMk/>
+          <pc:sldMk cId="1398332104" sldId="263"/>
+        </pc:sldMkLst>
+        <pc:spChg chg="mod">
+          <ac:chgData name="Viswa Viswanathan" userId="eeb7c4cd-bdfa-4397-b7a5-e8e212654fbb" providerId="ADAL" clId="{789CB485-5F3F-5DB7-AA3E-86007C2BD59C}" dt="2026-01-25T14:51:15.562" v="438" actId="20577"/>
+          <ac:spMkLst>
+            <pc:docMk/>
+            <pc:sldMk cId="1398332104" sldId="263"/>
+            <ac:spMk id="3" creationId="{084818F6-C7C0-5DF1-F745-47E963919782}"/>
+          </ac:spMkLst>
+        </pc:spChg>
+        <pc:spChg chg="mod">
+          <ac:chgData name="Viswa Viswanathan" userId="eeb7c4cd-bdfa-4397-b7a5-e8e212654fbb" providerId="ADAL" clId="{789CB485-5F3F-5DB7-AA3E-86007C2BD59C}" dt="2026-01-25T14:47:02.087" v="423" actId="20577"/>
+          <ac:spMkLst>
+            <pc:docMk/>
+            <pc:sldMk cId="1398332104" sldId="263"/>
+            <ac:spMk id="4" creationId="{12B2922A-552F-4BA8-65F0-94F9A63B8B34}"/>
+          </ac:spMkLst>
+        </pc:spChg>
+        <pc:spChg chg="add mod">
+          <ac:chgData name="Viswa Viswanathan" userId="eeb7c4cd-bdfa-4397-b7a5-e8e212654fbb" providerId="ADAL" clId="{789CB485-5F3F-5DB7-AA3E-86007C2BD59C}" dt="2026-01-25T14:46:17.033" v="412" actId="20577"/>
+          <ac:spMkLst>
+            <pc:docMk/>
+            <pc:sldMk cId="1398332104" sldId="263"/>
+            <ac:spMk id="7" creationId="{2CF35532-8EBD-2090-F812-2C9BB9E4DB35}"/>
+          </ac:spMkLst>
+        </pc:spChg>
+        <pc:grpChg chg="add mod">
+          <ac:chgData name="Viswa Viswanathan" userId="eeb7c4cd-bdfa-4397-b7a5-e8e212654fbb" providerId="ADAL" clId="{789CB485-5F3F-5DB7-AA3E-86007C2BD59C}" dt="2026-01-25T14:47:01.566" v="420" actId="20577"/>
+          <ac:grpSpMkLst>
+            <pc:docMk/>
+            <pc:sldMk cId="1398332104" sldId="263"/>
+            <ac:grpSpMk id="2" creationId="{4CBF2273-C976-0C60-837B-46E1628716EE}"/>
+          </ac:grpSpMkLst>
+        </pc:grpChg>
+        <pc:grpChg chg="add">
+          <ac:chgData name="Viswa Viswanathan" userId="eeb7c4cd-bdfa-4397-b7a5-e8e212654fbb" providerId="ADAL" clId="{789CB485-5F3F-5DB7-AA3E-86007C2BD59C}" dt="2026-01-25T14:47:45.786" v="428" actId="164"/>
+          <ac:grpSpMkLst>
+            <pc:docMk/>
+            <pc:sldMk cId="1398332104" sldId="263"/>
+            <ac:grpSpMk id="8" creationId="{73BA78C6-0A1C-4CB9-96AB-A54F44A6E764}"/>
+          </ac:grpSpMkLst>
+        </pc:grpChg>
+        <pc:cxnChg chg="mod">
+          <ac:chgData name="Viswa Viswanathan" userId="eeb7c4cd-bdfa-4397-b7a5-e8e212654fbb" providerId="ADAL" clId="{789CB485-5F3F-5DB7-AA3E-86007C2BD59C}" dt="2026-01-25T14:47:01.566" v="420" actId="20577"/>
+          <ac:cxnSpMkLst>
+            <pc:docMk/>
+            <pc:sldMk cId="1398332104" sldId="263"/>
+            <ac:cxnSpMk id="5" creationId="{6BFFB7FC-4CDE-D3CE-7D90-7676386C1C3B}"/>
+          </ac:cxnSpMkLst>
+        </pc:cxnChg>
+        <pc:cxnChg chg="mod">
+          <ac:chgData name="Viswa Viswanathan" userId="eeb7c4cd-bdfa-4397-b7a5-e8e212654fbb" providerId="ADAL" clId="{789CB485-5F3F-5DB7-AA3E-86007C2BD59C}" dt="2026-01-25T14:47:01.566" v="420" actId="20577"/>
+          <ac:cxnSpMkLst>
+            <pc:docMk/>
+            <pc:sldMk cId="1398332104" sldId="263"/>
+            <ac:cxnSpMk id="6" creationId="{C16F0CE1-99D1-A444-B134-89A61D37EAA5}"/>
+          </ac:cxnSpMkLst>
+        </pc:cxnChg>
+      </pc:sldChg>
+      <pc:sldChg chg="addSp modSp new mod">
+        <pc:chgData name="Viswa Viswanathan" userId="eeb7c4cd-bdfa-4397-b7a5-e8e212654fbb" providerId="ADAL" clId="{789CB485-5F3F-5DB7-AA3E-86007C2BD59C}" dt="2026-01-26T21:24:06.839" v="506" actId="164"/>
+        <pc:sldMkLst>
+          <pc:docMk/>
+          <pc:sldMk cId="3373826375" sldId="264"/>
+        </pc:sldMkLst>
+        <pc:spChg chg="add mod">
+          <ac:chgData name="Viswa Viswanathan" userId="eeb7c4cd-bdfa-4397-b7a5-e8e212654fbb" providerId="ADAL" clId="{789CB485-5F3F-5DB7-AA3E-86007C2BD59C}" dt="2026-01-26T21:12:08.626" v="461" actId="12788"/>
+          <ac:spMkLst>
+            <pc:docMk/>
+            <pc:sldMk cId="3373826375" sldId="264"/>
+            <ac:spMk id="3" creationId="{038F908B-E5DD-8D0F-A600-AAB81B7BCDD5}"/>
+          </ac:spMkLst>
+        </pc:spChg>
+        <pc:spChg chg="add mod">
+          <ac:chgData name="Viswa Viswanathan" userId="eeb7c4cd-bdfa-4397-b7a5-e8e212654fbb" providerId="ADAL" clId="{789CB485-5F3F-5DB7-AA3E-86007C2BD59C}" dt="2026-01-26T21:21:48.281" v="496" actId="1076"/>
+          <ac:spMkLst>
+            <pc:docMk/>
+            <pc:sldMk cId="3373826375" sldId="264"/>
+            <ac:spMk id="4" creationId="{F6A14F00-07EA-B9CE-0CB8-920EB9BD92C1}"/>
+          </ac:spMkLst>
+        </pc:spChg>
+        <pc:spChg chg="add mod">
+          <ac:chgData name="Viswa Viswanathan" userId="eeb7c4cd-bdfa-4397-b7a5-e8e212654fbb" providerId="ADAL" clId="{789CB485-5F3F-5DB7-AA3E-86007C2BD59C}" dt="2026-01-26T21:23:51.848" v="505"/>
+          <ac:spMkLst>
+            <pc:docMk/>
+            <pc:sldMk cId="3373826375" sldId="264"/>
+            <ac:spMk id="5" creationId="{8F32FE50-EC18-BECD-2E0F-812948F461E7}"/>
+          </ac:spMkLst>
+        </pc:spChg>
+        <pc:grpChg chg="add">
+          <ac:chgData name="Viswa Viswanathan" userId="eeb7c4cd-bdfa-4397-b7a5-e8e212654fbb" providerId="ADAL" clId="{789CB485-5F3F-5DB7-AA3E-86007C2BD59C}" dt="2026-01-26T21:24:06.839" v="506" actId="164"/>
+          <ac:grpSpMkLst>
+            <pc:docMk/>
+            <pc:sldMk cId="3373826375" sldId="264"/>
+            <ac:grpSpMk id="6" creationId="{7FF8FC98-2D5E-0999-79F8-6293637F7CA3}"/>
+          </ac:grpSpMkLst>
+        </pc:grpChg>
+      </pc:sldChg>
     </pc:docChg>
   </pc:docChgLst>
 </pc:chgInfo>
@@ -548,7 +692,7 @@
           <a:p>
             <a:fld id="{881A2B08-CF5C-DF47-8D7F-848C0AE3F928}" type="datetimeFigureOut">
               <a:rPr lang="en-US" smtClean="0"/>
-              <a:t>1/9/26</a:t>
+              <a:t>1/23/26</a:t>
             </a:fld>
             <a:endParaRPr lang="en-US"/>
           </a:p>
@@ -880,7 +1024,7 @@
           <a:p>
             <a:fld id="{A26EDFF5-7C57-844A-878E-F94030E79825}" type="slidenum">
               <a:rPr lang="en-US" smtClean="0"/>
-              <a:t>6</a:t>
+              <a:t>7</a:t>
             </a:fld>
             <a:endParaRPr lang="en-US"/>
           </a:p>
@@ -1046,7 +1190,7 @@
           <a:p>
             <a:fld id="{6FB1118E-0B00-8740-91F6-6173C96993E6}" type="datetimeFigureOut">
               <a:rPr lang="en-US" smtClean="0"/>
-              <a:t>1/9/26</a:t>
+              <a:t>1/23/26</a:t>
             </a:fld>
             <a:endParaRPr lang="en-US"/>
           </a:p>
@@ -1244,7 +1388,7 @@
           <a:p>
             <a:fld id="{6FB1118E-0B00-8740-91F6-6173C96993E6}" type="datetimeFigureOut">
               <a:rPr lang="en-US" smtClean="0"/>
-              <a:t>1/9/26</a:t>
+              <a:t>1/23/26</a:t>
             </a:fld>
             <a:endParaRPr lang="en-US"/>
           </a:p>
@@ -1452,7 +1596,7 @@
           <a:p>
             <a:fld id="{6FB1118E-0B00-8740-91F6-6173C96993E6}" type="datetimeFigureOut">
               <a:rPr lang="en-US" smtClean="0"/>
-              <a:t>1/9/26</a:t>
+              <a:t>1/23/26</a:t>
             </a:fld>
             <a:endParaRPr lang="en-US"/>
           </a:p>
@@ -1650,7 +1794,7 @@
           <a:p>
             <a:fld id="{6FB1118E-0B00-8740-91F6-6173C96993E6}" type="datetimeFigureOut">
               <a:rPr lang="en-US" smtClean="0"/>
-              <a:t>1/9/26</a:t>
+              <a:t>1/23/26</a:t>
             </a:fld>
             <a:endParaRPr lang="en-US"/>
           </a:p>
@@ -1925,7 +2069,7 @@
           <a:p>
             <a:fld id="{6FB1118E-0B00-8740-91F6-6173C96993E6}" type="datetimeFigureOut">
               <a:rPr lang="en-US" smtClean="0"/>
-              <a:t>1/9/26</a:t>
+              <a:t>1/23/26</a:t>
             </a:fld>
             <a:endParaRPr lang="en-US"/>
           </a:p>
@@ -2190,7 +2334,7 @@
           <a:p>
             <a:fld id="{6FB1118E-0B00-8740-91F6-6173C96993E6}" type="datetimeFigureOut">
               <a:rPr lang="en-US" smtClean="0"/>
-              <a:t>1/9/26</a:t>
+              <a:t>1/23/26</a:t>
             </a:fld>
             <a:endParaRPr lang="en-US"/>
           </a:p>
@@ -2602,7 +2746,7 @@
           <a:p>
             <a:fld id="{6FB1118E-0B00-8740-91F6-6173C96993E6}" type="datetimeFigureOut">
               <a:rPr lang="en-US" smtClean="0"/>
-              <a:t>1/9/26</a:t>
+              <a:t>1/23/26</a:t>
             </a:fld>
             <a:endParaRPr lang="en-US"/>
           </a:p>
@@ -2743,7 +2887,7 @@
           <a:p>
             <a:fld id="{6FB1118E-0B00-8740-91F6-6173C96993E6}" type="datetimeFigureOut">
               <a:rPr lang="en-US" smtClean="0"/>
-              <a:t>1/9/26</a:t>
+              <a:t>1/23/26</a:t>
             </a:fld>
             <a:endParaRPr lang="en-US"/>
           </a:p>
@@ -2856,7 +3000,7 @@
           <a:p>
             <a:fld id="{6FB1118E-0B00-8740-91F6-6173C96993E6}" type="datetimeFigureOut">
               <a:rPr lang="en-US" smtClean="0"/>
-              <a:t>1/9/26</a:t>
+              <a:t>1/23/26</a:t>
             </a:fld>
             <a:endParaRPr lang="en-US"/>
           </a:p>
@@ -3167,7 +3311,7 @@
           <a:p>
             <a:fld id="{6FB1118E-0B00-8740-91F6-6173C96993E6}" type="datetimeFigureOut">
               <a:rPr lang="en-US" smtClean="0"/>
-              <a:t>1/9/26</a:t>
+              <a:t>1/23/26</a:t>
             </a:fld>
             <a:endParaRPr lang="en-US"/>
           </a:p>
@@ -3455,7 +3599,7 @@
           <a:p>
             <a:fld id="{6FB1118E-0B00-8740-91F6-6173C96993E6}" type="datetimeFigureOut">
               <a:rPr lang="en-US" smtClean="0"/>
-              <a:t>1/9/26</a:t>
+              <a:t>1/23/26</a:t>
             </a:fld>
             <a:endParaRPr lang="en-US"/>
           </a:p>
@@ -3696,7 +3840,7 @@
           <a:p>
             <a:fld id="{6FB1118E-0B00-8740-91F6-6173C96993E6}" type="datetimeFigureOut">
               <a:rPr lang="en-US" smtClean="0"/>
-              <a:t>1/9/26</a:t>
+              <a:t>1/23/26</a:t>
             </a:fld>
             <a:endParaRPr lang="en-US"/>
           </a:p>
@@ -5803,10 +5947,2027 @@
           <a:chExt cx="0" cy="0"/>
         </a:xfrm>
       </p:grpSpPr>
+      <p:grpSp>
+        <p:nvGrpSpPr>
+          <p:cNvPr id="6" name="Group 5">
+            <a:extLst>
+              <a:ext uri="{FF2B5EF4-FFF2-40B4-BE49-F238E27FC236}">
+                <a16:creationId xmlns:a16="http://schemas.microsoft.com/office/drawing/2014/main" id="{7FF8FC98-2D5E-0999-79F8-6293637F7CA3}"/>
+              </a:ext>
+            </a:extLst>
+          </p:cNvPr>
+          <p:cNvGrpSpPr/>
+          <p:nvPr/>
+        </p:nvGrpSpPr>
+        <p:grpSpPr>
+          <a:xfrm>
+            <a:off x="1323473" y="2394104"/>
+            <a:ext cx="7186863" cy="2573996"/>
+            <a:chOff x="1323473" y="2394104"/>
+            <a:chExt cx="7186863" cy="2573996"/>
+          </a:xfrm>
+        </p:grpSpPr>
+        <p:sp>
+          <p:nvSpPr>
+            <p:cNvPr id="3" name="TextBox 2">
+              <a:extLst>
+                <a:ext uri="{FF2B5EF4-FFF2-40B4-BE49-F238E27FC236}">
+                  <a16:creationId xmlns:a16="http://schemas.microsoft.com/office/drawing/2014/main" id="{038F908B-E5DD-8D0F-A600-AAB81B7BCDD5}"/>
+                </a:ext>
+              </a:extLst>
+            </p:cNvPr>
+            <p:cNvSpPr txBox="1"/>
+            <p:nvPr/>
+          </p:nvSpPr>
+          <p:spPr>
+            <a:xfrm>
+              <a:off x="1323473" y="2394104"/>
+              <a:ext cx="7186863" cy="584775"/>
+            </a:xfrm>
+            <a:prstGeom prst="rect">
+              <a:avLst/>
+            </a:prstGeom>
+            <a:noFill/>
+          </p:spPr>
+          <p:txBody>
+            <a:bodyPr wrap="square">
+              <a:spAutoFit/>
+            </a:bodyPr>
+            <a:lstStyle/>
+            <a:p>
+              <a:pPr>
+                <a:buNone/>
+              </a:pPr>
+              <a:r>
+                <a:rPr lang="en-US" sz="3200" dirty="0">
+                  <a:latin typeface="Andale Mono" panose="020B0509000000000004" pitchFamily="49" charset="0"/>
+                  <a:cs typeface="Courier New" panose="02070309020205020404" pitchFamily="49" charset="0"/>
+                </a:rPr>
+                <a:t>4, 2, 6, 1, 8, 1, 3, 9, 2, 4</a:t>
+              </a:r>
+            </a:p>
+          </p:txBody>
+        </p:sp>
+        <p:sp>
+          <p:nvSpPr>
+            <p:cNvPr id="4" name="TextBox 3">
+              <a:extLst>
+                <a:ext uri="{FF2B5EF4-FFF2-40B4-BE49-F238E27FC236}">
+                  <a16:creationId xmlns:a16="http://schemas.microsoft.com/office/drawing/2014/main" id="{F6A14F00-07EA-B9CE-0CB8-920EB9BD92C1}"/>
+                </a:ext>
+              </a:extLst>
+            </p:cNvPr>
+            <p:cNvSpPr txBox="1"/>
+            <p:nvPr/>
+          </p:nvSpPr>
+          <p:spPr>
+            <a:xfrm>
+              <a:off x="4634183" y="4383325"/>
+              <a:ext cx="645653" cy="584775"/>
+            </a:xfrm>
+            <a:prstGeom prst="rect">
+              <a:avLst/>
+            </a:prstGeom>
+            <a:noFill/>
+          </p:spPr>
+          <p:txBody>
+            <a:bodyPr wrap="square">
+              <a:spAutoFit/>
+            </a:bodyPr>
+            <a:lstStyle/>
+            <a:p>
+              <a:pPr>
+                <a:buNone/>
+              </a:pPr>
+              <a:r>
+                <a:rPr lang="en-US" sz="3200" dirty="0">
+                  <a:latin typeface="Andale Mono" panose="020B0509000000000004" pitchFamily="49" charset="0"/>
+                  <a:cs typeface="Courier New" panose="02070309020205020404" pitchFamily="49" charset="0"/>
+                </a:rPr>
+                <a:t>4</a:t>
+              </a:r>
+            </a:p>
+          </p:txBody>
+        </p:sp>
+        <p:sp>
+          <p:nvSpPr>
+            <p:cNvPr id="5" name="Triangle 4">
+              <a:extLst>
+                <a:ext uri="{FF2B5EF4-FFF2-40B4-BE49-F238E27FC236}">
+                  <a16:creationId xmlns:a16="http://schemas.microsoft.com/office/drawing/2014/main" id="{8F32FE50-EC18-BECD-2E0F-812948F461E7}"/>
+                </a:ext>
+              </a:extLst>
+            </p:cNvPr>
+            <p:cNvSpPr/>
+            <p:nvPr/>
+          </p:nvSpPr>
+          <p:spPr>
+            <a:xfrm flipH="1" flipV="1">
+              <a:off x="1580147" y="2978879"/>
+              <a:ext cx="6577264" cy="1328426"/>
+            </a:xfrm>
+            <a:custGeom>
+              <a:avLst/>
+              <a:gdLst>
+                <a:gd name="csX0" fmla="*/ 0 w 6577264"/>
+                <a:gd name="csY0" fmla="*/ 1328426 h 1328426"/>
+                <a:gd name="csX1" fmla="*/ 3288632 w 6577264"/>
+                <a:gd name="csY1" fmla="*/ 0 h 1328426"/>
+                <a:gd name="csX2" fmla="*/ 6577264 w 6577264"/>
+                <a:gd name="csY2" fmla="*/ 1328426 h 1328426"/>
+                <a:gd name="csX3" fmla="*/ 0 w 6577264"/>
+                <a:gd name="csY3" fmla="*/ 1328426 h 1328426"/>
+                <a:gd name="csX0" fmla="*/ 0 w 6577264"/>
+                <a:gd name="csY0" fmla="*/ 1328426 h 1328426"/>
+                <a:gd name="csX1" fmla="*/ 3288632 w 6577264"/>
+                <a:gd name="csY1" fmla="*/ 0 h 1328426"/>
+                <a:gd name="csX2" fmla="*/ 4836695 w 6577264"/>
+                <a:gd name="csY2" fmla="*/ 617621 h 1328426"/>
+                <a:gd name="csX3" fmla="*/ 6577264 w 6577264"/>
+                <a:gd name="csY3" fmla="*/ 1328426 h 1328426"/>
+                <a:gd name="csX4" fmla="*/ 0 w 6577264"/>
+                <a:gd name="csY4" fmla="*/ 1328426 h 1328426"/>
+                <a:gd name="csX0" fmla="*/ 0 w 6577264"/>
+                <a:gd name="csY0" fmla="*/ 1328426 h 1328426"/>
+                <a:gd name="csX1" fmla="*/ 1820779 w 6577264"/>
+                <a:gd name="csY1" fmla="*/ 585537 h 1328426"/>
+                <a:gd name="csX2" fmla="*/ 3288632 w 6577264"/>
+                <a:gd name="csY2" fmla="*/ 0 h 1328426"/>
+                <a:gd name="csX3" fmla="*/ 4836695 w 6577264"/>
+                <a:gd name="csY3" fmla="*/ 617621 h 1328426"/>
+                <a:gd name="csX4" fmla="*/ 6577264 w 6577264"/>
+                <a:gd name="csY4" fmla="*/ 1328426 h 1328426"/>
+                <a:gd name="csX5" fmla="*/ 0 w 6577264"/>
+                <a:gd name="csY5" fmla="*/ 1328426 h 1328426"/>
+                <a:gd name="csX0" fmla="*/ 0 w 6577264"/>
+                <a:gd name="csY0" fmla="*/ 1328426 h 1328426"/>
+                <a:gd name="csX1" fmla="*/ 1820779 w 6577264"/>
+                <a:gd name="csY1" fmla="*/ 585537 h 1328426"/>
+                <a:gd name="csX2" fmla="*/ 3288632 w 6577264"/>
+                <a:gd name="csY2" fmla="*/ 0 h 1328426"/>
+                <a:gd name="csX3" fmla="*/ 4499811 w 6577264"/>
+                <a:gd name="csY3" fmla="*/ 713873 h 1328426"/>
+                <a:gd name="csX4" fmla="*/ 6577264 w 6577264"/>
+                <a:gd name="csY4" fmla="*/ 1328426 h 1328426"/>
+                <a:gd name="csX5" fmla="*/ 0 w 6577264"/>
+                <a:gd name="csY5" fmla="*/ 1328426 h 1328426"/>
+                <a:gd name="csX0" fmla="*/ 0 w 6577264"/>
+                <a:gd name="csY0" fmla="*/ 1328426 h 1328426"/>
+                <a:gd name="csX1" fmla="*/ 2213811 w 6577264"/>
+                <a:gd name="csY1" fmla="*/ 689810 h 1328426"/>
+                <a:gd name="csX2" fmla="*/ 3288632 w 6577264"/>
+                <a:gd name="csY2" fmla="*/ 0 h 1328426"/>
+                <a:gd name="csX3" fmla="*/ 4499811 w 6577264"/>
+                <a:gd name="csY3" fmla="*/ 713873 h 1328426"/>
+                <a:gd name="csX4" fmla="*/ 6577264 w 6577264"/>
+                <a:gd name="csY4" fmla="*/ 1328426 h 1328426"/>
+                <a:gd name="csX5" fmla="*/ 0 w 6577264"/>
+                <a:gd name="csY5" fmla="*/ 1328426 h 1328426"/>
+              </a:gdLst>
+              <a:ahLst/>
+              <a:cxnLst>
+                <a:cxn ang="0">
+                  <a:pos x="csX0" y="csY0"/>
+                </a:cxn>
+                <a:cxn ang="0">
+                  <a:pos x="csX1" y="csY1"/>
+                </a:cxn>
+                <a:cxn ang="0">
+                  <a:pos x="csX2" y="csY2"/>
+                </a:cxn>
+                <a:cxn ang="0">
+                  <a:pos x="csX3" y="csY3"/>
+                </a:cxn>
+                <a:cxn ang="0">
+                  <a:pos x="csX4" y="csY4"/>
+                </a:cxn>
+                <a:cxn ang="0">
+                  <a:pos x="csX5" y="csY5"/>
+                </a:cxn>
+              </a:cxnLst>
+              <a:rect l="l" t="t" r="r" b="b"/>
+              <a:pathLst>
+                <a:path w="6577264" h="1328426">
+                  <a:moveTo>
+                    <a:pt x="0" y="1328426"/>
+                  </a:moveTo>
+                  <a:lnTo>
+                    <a:pt x="2213811" y="689810"/>
+                  </a:lnTo>
+                  <a:lnTo>
+                    <a:pt x="3288632" y="0"/>
+                  </a:lnTo>
+                  <a:lnTo>
+                    <a:pt x="4499811" y="713873"/>
+                  </a:lnTo>
+                  <a:lnTo>
+                    <a:pt x="6577264" y="1328426"/>
+                  </a:lnTo>
+                  <a:lnTo>
+                    <a:pt x="0" y="1328426"/>
+                  </a:lnTo>
+                  <a:close/>
+                </a:path>
+              </a:pathLst>
+            </a:custGeom>
+            <a:gradFill>
+              <a:gsLst>
+                <a:gs pos="0">
+                  <a:schemeClr val="accent1">
+                    <a:lumMod val="5000"/>
+                    <a:lumOff val="95000"/>
+                  </a:schemeClr>
+                </a:gs>
+                <a:gs pos="74000">
+                  <a:schemeClr val="accent1">
+                    <a:lumMod val="45000"/>
+                    <a:lumOff val="55000"/>
+                  </a:schemeClr>
+                </a:gs>
+                <a:gs pos="83000">
+                  <a:schemeClr val="accent1">
+                    <a:lumMod val="45000"/>
+                    <a:lumOff val="55000"/>
+                  </a:schemeClr>
+                </a:gs>
+                <a:gs pos="100000">
+                  <a:schemeClr val="accent1">
+                    <a:lumMod val="30000"/>
+                    <a:lumOff val="70000"/>
+                  </a:schemeClr>
+                </a:gs>
+              </a:gsLst>
+              <a:lin ang="5400000" scaled="1"/>
+            </a:gradFill>
+          </p:spPr>
+          <p:style>
+            <a:lnRef idx="2">
+              <a:schemeClr val="accent1">
+                <a:shade val="15000"/>
+              </a:schemeClr>
+            </a:lnRef>
+            <a:fillRef idx="1">
+              <a:schemeClr val="accent1"/>
+            </a:fillRef>
+            <a:effectRef idx="0">
+              <a:schemeClr val="accent1"/>
+            </a:effectRef>
+            <a:fontRef idx="minor">
+              <a:schemeClr val="lt1"/>
+            </a:fontRef>
+          </p:style>
+          <p:txBody>
+            <a:bodyPr rtlCol="0" anchor="ctr"/>
+            <a:lstStyle/>
+            <a:p>
+              <a:pPr algn="ctr"/>
+              <a:endParaRPr lang="en-US"/>
+            </a:p>
+          </p:txBody>
+        </p:sp>
+      </p:grpSp>
+    </p:spTree>
+    <p:extLst>
+      <p:ext uri="{BB962C8B-B14F-4D97-AF65-F5344CB8AC3E}">
+        <p14:creationId xmlns:p14="http://schemas.microsoft.com/office/powerpoint/2010/main" val="3373826375"/>
+      </p:ext>
+    </p:extLst>
+  </p:cSld>
+  <p:clrMapOvr>
+    <a:masterClrMapping/>
+  </p:clrMapOvr>
+</p:sld>
+</file>
+
+<file path=ppt/slides/slide7.xml><?xml version="1.0" encoding="utf-8"?>
+<p:sld xmlns:a="http://schemas.openxmlformats.org/drawingml/2006/main" xmlns:r="http://schemas.openxmlformats.org/officeDocument/2006/relationships" xmlns:p="http://schemas.openxmlformats.org/presentationml/2006/main">
+  <p:cSld>
+    <p:spTree>
+      <p:nvGrpSpPr>
+        <p:cNvPr id="1" name=""/>
+        <p:cNvGrpSpPr/>
+        <p:nvPr/>
+      </p:nvGrpSpPr>
+      <p:grpSpPr>
+        <a:xfrm>
+          <a:off x="0" y="0"/>
+          <a:ext cx="0" cy="0"/>
+          <a:chOff x="0" y="0"/>
+          <a:chExt cx="0" cy="0"/>
+        </a:xfrm>
+      </p:grpSpPr>
+      <p:pic>
+        <p:nvPicPr>
+          <p:cNvPr id="12" name="Picture 11">
+            <a:extLst>
+              <a:ext uri="{FF2B5EF4-FFF2-40B4-BE49-F238E27FC236}">
+                <a16:creationId xmlns:a16="http://schemas.microsoft.com/office/drawing/2014/main" id="{0B15638C-1110-61AB-0820-BA0F66D78E49}"/>
+              </a:ext>
+            </a:extLst>
+          </p:cNvPr>
+          <p:cNvPicPr>
+            <a:picLocks noChangeAspect="1"/>
+          </p:cNvPicPr>
+          <p:nvPr/>
+        </p:nvPicPr>
+        <p:blipFill>
+          <a:blip r:embed="rId3"/>
+          <a:stretch>
+            <a:fillRect/>
+          </a:stretch>
+        </p:blipFill>
+        <p:spPr>
+          <a:xfrm>
+            <a:off x="2209800" y="716788"/>
+            <a:ext cx="7772400" cy="5424424"/>
+          </a:xfrm>
+          <a:prstGeom prst="rect">
+            <a:avLst/>
+          </a:prstGeom>
+        </p:spPr>
+      </p:pic>
     </p:spTree>
     <p:extLst>
       <p:ext uri="{BB962C8B-B14F-4D97-AF65-F5344CB8AC3E}">
         <p14:creationId xmlns:p14="http://schemas.microsoft.com/office/powerpoint/2010/main" val="497765789"/>
+      </p:ext>
+    </p:extLst>
+  </p:cSld>
+  <p:clrMapOvr>
+    <a:masterClrMapping/>
+  </p:clrMapOvr>
+</p:sld>
+</file>
+
+<file path=ppt/slides/slide8.xml><?xml version="1.0" encoding="utf-8"?>
+<p:sld xmlns:a="http://schemas.openxmlformats.org/drawingml/2006/main" xmlns:r="http://schemas.openxmlformats.org/officeDocument/2006/relationships" xmlns:p="http://schemas.openxmlformats.org/presentationml/2006/main">
+  <p:cSld>
+    <p:spTree>
+      <p:nvGrpSpPr>
+        <p:cNvPr id="1" name=""/>
+        <p:cNvGrpSpPr/>
+        <p:nvPr/>
+      </p:nvGrpSpPr>
+      <p:grpSpPr>
+        <a:xfrm>
+          <a:off x="0" y="0"/>
+          <a:ext cx="0" cy="0"/>
+          <a:chOff x="0" y="0"/>
+          <a:chExt cx="0" cy="0"/>
+        </a:xfrm>
+      </p:grpSpPr>
+      <p:grpSp>
+        <p:nvGrpSpPr>
+          <p:cNvPr id="13" name="Group 12">
+            <a:extLst>
+              <a:ext uri="{FF2B5EF4-FFF2-40B4-BE49-F238E27FC236}">
+                <a16:creationId xmlns:a16="http://schemas.microsoft.com/office/drawing/2014/main" id="{A4056F16-7DF2-C97A-6403-6C96D4808F18}"/>
+              </a:ext>
+            </a:extLst>
+          </p:cNvPr>
+          <p:cNvGrpSpPr/>
+          <p:nvPr/>
+        </p:nvGrpSpPr>
+        <p:grpSpPr>
+          <a:xfrm>
+            <a:off x="662152" y="810358"/>
+            <a:ext cx="9543394" cy="1384995"/>
+            <a:chOff x="662152" y="2167589"/>
+            <a:chExt cx="9543394" cy="1384995"/>
+          </a:xfrm>
+        </p:grpSpPr>
+        <p:sp>
+          <p:nvSpPr>
+            <p:cNvPr id="2" name="Rectangle 1">
+              <a:extLst>
+                <a:ext uri="{FF2B5EF4-FFF2-40B4-BE49-F238E27FC236}">
+                  <a16:creationId xmlns:a16="http://schemas.microsoft.com/office/drawing/2014/main" id="{0A3E5002-7B6B-E02E-628E-90D766B6B000}"/>
+                </a:ext>
+              </a:extLst>
+            </p:cNvPr>
+            <p:cNvSpPr/>
+            <p:nvPr/>
+          </p:nvSpPr>
+          <p:spPr>
+            <a:xfrm>
+              <a:off x="3815255" y="2229466"/>
+              <a:ext cx="2469931" cy="1261241"/>
+            </a:xfrm>
+            <a:prstGeom prst="rect">
+              <a:avLst/>
+            </a:prstGeom>
+            <a:ln w="38100">
+              <a:solidFill>
+                <a:schemeClr val="tx1"/>
+              </a:solidFill>
+            </a:ln>
+          </p:spPr>
+          <p:style>
+            <a:lnRef idx="2">
+              <a:schemeClr val="accent6"/>
+            </a:lnRef>
+            <a:fillRef idx="1">
+              <a:schemeClr val="lt1"/>
+            </a:fillRef>
+            <a:effectRef idx="0">
+              <a:schemeClr val="accent6"/>
+            </a:effectRef>
+            <a:fontRef idx="minor">
+              <a:schemeClr val="dk1"/>
+            </a:fontRef>
+          </p:style>
+          <p:txBody>
+            <a:bodyPr rtlCol="0" anchor="ctr"/>
+            <a:lstStyle/>
+            <a:p>
+              <a:pPr algn="ctr"/>
+              <a:r>
+                <a:rPr lang="en-US" sz="3200" dirty="0"/>
+                <a:t>Beach kiosk model </a:t>
+              </a:r>
+            </a:p>
+          </p:txBody>
+        </p:sp>
+        <p:sp>
+          <p:nvSpPr>
+            <p:cNvPr id="3" name="TextBox 2">
+              <a:extLst>
+                <a:ext uri="{FF2B5EF4-FFF2-40B4-BE49-F238E27FC236}">
+                  <a16:creationId xmlns:a16="http://schemas.microsoft.com/office/drawing/2014/main" id="{A01A5C40-7FF4-F412-513F-365DD14DAA63}"/>
+                </a:ext>
+              </a:extLst>
+            </p:cNvPr>
+            <p:cNvSpPr txBox="1"/>
+            <p:nvPr/>
+          </p:nvSpPr>
+          <p:spPr>
+            <a:xfrm>
+              <a:off x="662152" y="2598476"/>
+              <a:ext cx="2102179" cy="523220"/>
+            </a:xfrm>
+            <a:prstGeom prst="rect">
+              <a:avLst/>
+            </a:prstGeom>
+            <a:noFill/>
+          </p:spPr>
+          <p:txBody>
+            <a:bodyPr wrap="none" rtlCol="0">
+              <a:spAutoFit/>
+            </a:bodyPr>
+            <a:lstStyle/>
+            <a:p>
+              <a:r>
+                <a:rPr lang="en-US" sz="2800" dirty="0"/>
+                <a:t>temperature</a:t>
+              </a:r>
+            </a:p>
+          </p:txBody>
+        </p:sp>
+        <p:sp>
+          <p:nvSpPr>
+            <p:cNvPr id="4" name="TextBox 3">
+              <a:extLst>
+                <a:ext uri="{FF2B5EF4-FFF2-40B4-BE49-F238E27FC236}">
+                  <a16:creationId xmlns:a16="http://schemas.microsoft.com/office/drawing/2014/main" id="{2476DD39-9FED-DADF-4379-9DE2E87041E0}"/>
+                </a:ext>
+              </a:extLst>
+            </p:cNvPr>
+            <p:cNvSpPr txBox="1"/>
+            <p:nvPr/>
+          </p:nvSpPr>
+          <p:spPr>
+            <a:xfrm>
+              <a:off x="7578951" y="2167589"/>
+              <a:ext cx="2626595" cy="1384995"/>
+            </a:xfrm>
+            <a:prstGeom prst="rect">
+              <a:avLst/>
+            </a:prstGeom>
+            <a:noFill/>
+          </p:spPr>
+          <p:txBody>
+            <a:bodyPr wrap="square" rtlCol="0">
+              <a:spAutoFit/>
+            </a:bodyPr>
+            <a:lstStyle/>
+            <a:p>
+              <a:r>
+                <a:rPr lang="en-US" sz="2800" dirty="0"/>
+                <a:t>Predicted number of customers</a:t>
+              </a:r>
+            </a:p>
+          </p:txBody>
+        </p:sp>
+        <p:cxnSp>
+          <p:nvCxnSpPr>
+            <p:cNvPr id="6" name="Straight Arrow Connector 5">
+              <a:extLst>
+                <a:ext uri="{FF2B5EF4-FFF2-40B4-BE49-F238E27FC236}">
+                  <a16:creationId xmlns:a16="http://schemas.microsoft.com/office/drawing/2014/main" id="{355BF273-DE9B-E1D6-6672-CA1B546D8C2E}"/>
+                </a:ext>
+              </a:extLst>
+            </p:cNvPr>
+            <p:cNvCxnSpPr>
+              <a:cxnSpLocks/>
+              <a:stCxn id="3" idx="3"/>
+            </p:cNvCxnSpPr>
+            <p:nvPr/>
+          </p:nvCxnSpPr>
+          <p:spPr>
+            <a:xfrm flipV="1">
+              <a:off x="2764331" y="2844698"/>
+              <a:ext cx="1050924" cy="15388"/>
+            </a:xfrm>
+            <a:prstGeom prst="straightConnector1">
+              <a:avLst/>
+            </a:prstGeom>
+            <a:ln w="76200">
+              <a:solidFill>
+                <a:schemeClr val="bg1">
+                  <a:lumMod val="50000"/>
+                </a:schemeClr>
+              </a:solidFill>
+              <a:tailEnd type="triangle"/>
+            </a:ln>
+          </p:spPr>
+          <p:style>
+            <a:lnRef idx="2">
+              <a:schemeClr val="accent1"/>
+            </a:lnRef>
+            <a:fillRef idx="0">
+              <a:schemeClr val="accent1"/>
+            </a:fillRef>
+            <a:effectRef idx="1">
+              <a:schemeClr val="accent1"/>
+            </a:effectRef>
+            <a:fontRef idx="minor">
+              <a:schemeClr val="tx1"/>
+            </a:fontRef>
+          </p:style>
+        </p:cxnSp>
+        <p:cxnSp>
+          <p:nvCxnSpPr>
+            <p:cNvPr id="8" name="Straight Arrow Connector 7">
+              <a:extLst>
+                <a:ext uri="{FF2B5EF4-FFF2-40B4-BE49-F238E27FC236}">
+                  <a16:creationId xmlns:a16="http://schemas.microsoft.com/office/drawing/2014/main" id="{61E6F99B-3A03-6C92-599D-58D7E1685353}"/>
+                </a:ext>
+              </a:extLst>
+            </p:cNvPr>
+            <p:cNvCxnSpPr>
+              <a:cxnSpLocks/>
+            </p:cNvCxnSpPr>
+            <p:nvPr/>
+          </p:nvCxnSpPr>
+          <p:spPr>
+            <a:xfrm flipV="1">
+              <a:off x="6285189" y="2829148"/>
+              <a:ext cx="1241212" cy="30938"/>
+            </a:xfrm>
+            <a:prstGeom prst="straightConnector1">
+              <a:avLst/>
+            </a:prstGeom>
+            <a:ln w="76200">
+              <a:solidFill>
+                <a:schemeClr val="bg1">
+                  <a:lumMod val="50000"/>
+                </a:schemeClr>
+              </a:solidFill>
+              <a:tailEnd type="triangle"/>
+            </a:ln>
+          </p:spPr>
+          <p:style>
+            <a:lnRef idx="2">
+              <a:schemeClr val="accent1"/>
+            </a:lnRef>
+            <a:fillRef idx="0">
+              <a:schemeClr val="accent1"/>
+            </a:fillRef>
+            <a:effectRef idx="1">
+              <a:schemeClr val="accent1"/>
+            </a:effectRef>
+            <a:fontRef idx="minor">
+              <a:schemeClr val="tx1"/>
+            </a:fontRef>
+          </p:style>
+        </p:cxnSp>
+      </p:grpSp>
+      <p:grpSp>
+        <p:nvGrpSpPr>
+          <p:cNvPr id="30" name="Group 29">
+            <a:extLst>
+              <a:ext uri="{FF2B5EF4-FFF2-40B4-BE49-F238E27FC236}">
+                <a16:creationId xmlns:a16="http://schemas.microsoft.com/office/drawing/2014/main" id="{4ABD37B4-9E1F-154D-2392-4C73F07FE41F}"/>
+              </a:ext>
+            </a:extLst>
+          </p:cNvPr>
+          <p:cNvGrpSpPr/>
+          <p:nvPr/>
+        </p:nvGrpSpPr>
+        <p:grpSpPr>
+          <a:xfrm>
+            <a:off x="1776461" y="4355514"/>
+            <a:ext cx="7251924" cy="1261241"/>
+            <a:chOff x="1776461" y="4355514"/>
+            <a:chExt cx="7251924" cy="1261241"/>
+          </a:xfrm>
+        </p:grpSpPr>
+        <p:grpSp>
+          <p:nvGrpSpPr>
+            <p:cNvPr id="14" name="Group 13">
+              <a:extLst>
+                <a:ext uri="{FF2B5EF4-FFF2-40B4-BE49-F238E27FC236}">
+                  <a16:creationId xmlns:a16="http://schemas.microsoft.com/office/drawing/2014/main" id="{A66FB24D-9BAD-3928-3B7C-189E29BB25E4}"/>
+                </a:ext>
+              </a:extLst>
+            </p:cNvPr>
+            <p:cNvGrpSpPr/>
+            <p:nvPr/>
+          </p:nvGrpSpPr>
+          <p:grpSpPr>
+            <a:xfrm>
+              <a:off x="2396360" y="4355514"/>
+              <a:ext cx="6632025" cy="1261241"/>
+              <a:chOff x="2532994" y="2229466"/>
+              <a:chExt cx="6632025" cy="1261241"/>
+            </a:xfrm>
+          </p:grpSpPr>
+          <mc:AlternateContent xmlns:mc="http://schemas.openxmlformats.org/markup-compatibility/2006">
+            <mc:Choice xmlns:a14="http://schemas.microsoft.com/office/drawing/2010/main" Requires="a14">
+              <p:sp>
+                <p:nvSpPr>
+                  <p:cNvPr id="15" name="Rectangle 14">
+                    <a:extLst>
+                      <a:ext uri="{FF2B5EF4-FFF2-40B4-BE49-F238E27FC236}">
+                        <a16:creationId xmlns:a16="http://schemas.microsoft.com/office/drawing/2014/main" id="{C7551B2C-1AA9-7E38-DD98-FDAADE8941B1}"/>
+                      </a:ext>
+                    </a:extLst>
+                  </p:cNvPr>
+                  <p:cNvSpPr/>
+                  <p:nvPr/>
+                </p:nvSpPr>
+                <p:spPr>
+                  <a:xfrm>
+                    <a:off x="3815255" y="2229466"/>
+                    <a:ext cx="3079533" cy="1261241"/>
+                  </a:xfrm>
+                  <a:prstGeom prst="rect">
+                    <a:avLst/>
+                  </a:prstGeom>
+                  <a:ln w="38100">
+                    <a:solidFill>
+                      <a:schemeClr val="tx1"/>
+                    </a:solidFill>
+                  </a:ln>
+                </p:spPr>
+                <p:style>
+                  <a:lnRef idx="2">
+                    <a:schemeClr val="accent6"/>
+                  </a:lnRef>
+                  <a:fillRef idx="1">
+                    <a:schemeClr val="lt1"/>
+                  </a:fillRef>
+                  <a:effectRef idx="0">
+                    <a:schemeClr val="accent6"/>
+                  </a:effectRef>
+                  <a:fontRef idx="minor">
+                    <a:schemeClr val="dk1"/>
+                  </a:fontRef>
+                </p:style>
+                <p:txBody>
+                  <a:bodyPr rtlCol="0" anchor="ctr"/>
+                  <a:lstStyle/>
+                  <a:p>
+                    <a:pPr algn="ctr"/>
+                    <a14:m>
+                      <m:oMathPara xmlns:m="http://schemas.openxmlformats.org/officeDocument/2006/math">
+                        <m:oMathParaPr>
+                          <m:jc m:val="centerGroup"/>
+                        </m:oMathParaPr>
+                        <m:oMath xmlns:m="http://schemas.openxmlformats.org/officeDocument/2006/math">
+                          <m:r>
+                            <a:rPr lang="en-US" sz="3200" b="0" i="1" smtClean="0">
+                              <a:latin typeface="Cambria Math" panose="02040503050406030204" pitchFamily="18" charset="0"/>
+                            </a:rPr>
+                            <m:t>15+2</m:t>
+                          </m:r>
+                          <m:r>
+                            <a:rPr lang="en-US" sz="3200" b="0" i="1" smtClean="0">
+                              <a:latin typeface="Cambria Math" panose="02040503050406030204" pitchFamily="18" charset="0"/>
+                            </a:rPr>
+                            <m:t>𝑡</m:t>
+                          </m:r>
+                        </m:oMath>
+                      </m:oMathPara>
+                    </a14:m>
+                    <a:endParaRPr lang="en-US" sz="3200" dirty="0"/>
+                  </a:p>
+                </p:txBody>
+              </p:sp>
+            </mc:Choice>
+            <mc:Fallback>
+              <p:sp>
+                <p:nvSpPr>
+                  <p:cNvPr id="15" name="Rectangle 14">
+                    <a:extLst>
+                      <a:ext uri="{FF2B5EF4-FFF2-40B4-BE49-F238E27FC236}">
+                        <a16:creationId xmlns:a16="http://schemas.microsoft.com/office/drawing/2014/main" id="{C7551B2C-1AA9-7E38-DD98-FDAADE8941B1}"/>
+                      </a:ext>
+                    </a:extLst>
+                  </p:cNvPr>
+                  <p:cNvSpPr>
+                    <a:spLocks noRot="1" noChangeAspect="1" noMove="1" noResize="1" noEditPoints="1" noAdjustHandles="1" noChangeArrowheads="1" noChangeShapeType="1" noTextEdit="1"/>
+                  </p:cNvSpPr>
+                  <p:nvPr/>
+                </p:nvSpPr>
+                <p:spPr>
+                  <a:xfrm>
+                    <a:off x="3815255" y="2229466"/>
+                    <a:ext cx="3079533" cy="1261241"/>
+                  </a:xfrm>
+                  <a:prstGeom prst="rect">
+                    <a:avLst/>
+                  </a:prstGeom>
+                  <a:blipFill>
+                    <a:blip r:embed="rId2"/>
+                    <a:stretch>
+                      <a:fillRect/>
+                    </a:stretch>
+                  </a:blipFill>
+                  <a:ln w="38100">
+                    <a:solidFill>
+                      <a:schemeClr val="tx1"/>
+                    </a:solidFill>
+                  </a:ln>
+                </p:spPr>
+                <p:txBody>
+                  <a:bodyPr/>
+                  <a:lstStyle/>
+                  <a:p>
+                    <a:r>
+                      <a:rPr lang="en-US">
+                        <a:noFill/>
+                      </a:rPr>
+                      <a:t> </a:t>
+                    </a:r>
+                  </a:p>
+                </p:txBody>
+              </p:sp>
+            </mc:Fallback>
+          </mc:AlternateContent>
+          <mc:AlternateContent xmlns:mc="http://schemas.openxmlformats.org/markup-compatibility/2006">
+            <mc:Choice xmlns:a14="http://schemas.microsoft.com/office/drawing/2010/main" Requires="a14">
+              <p:sp>
+                <p:nvSpPr>
+                  <p:cNvPr id="17" name="TextBox 16">
+                    <a:extLst>
+                      <a:ext uri="{FF2B5EF4-FFF2-40B4-BE49-F238E27FC236}">
+                        <a16:creationId xmlns:a16="http://schemas.microsoft.com/office/drawing/2014/main" id="{7E5338C1-7C34-0A28-59B0-12735D42A3EF}"/>
+                      </a:ext>
+                    </a:extLst>
+                  </p:cNvPr>
+                  <p:cNvSpPr txBox="1"/>
+                  <p:nvPr/>
+                </p:nvSpPr>
+                <p:spPr>
+                  <a:xfrm>
+                    <a:off x="8177046" y="2503920"/>
+                    <a:ext cx="987973" cy="646331"/>
+                  </a:xfrm>
+                  <a:prstGeom prst="rect">
+                    <a:avLst/>
+                  </a:prstGeom>
+                  <a:noFill/>
+                </p:spPr>
+                <p:txBody>
+                  <a:bodyPr wrap="square" rtlCol="0">
+                    <a:spAutoFit/>
+                  </a:bodyPr>
+                  <a:lstStyle/>
+                  <a:p>
+                    <a:r>
+                      <a:rPr lang="en-US" sz="3600" dirty="0"/>
+                      <a:t>155</a:t>
+                    </a:r>
+                    <a14:m/>
+                  </a:p>
+                </p:txBody>
+              </p:sp>
+            </mc:Choice>
+            <mc:Fallback>
+              <p:sp>
+                <p:nvSpPr>
+                  <p:cNvPr id="17" name="TextBox 16">
+                    <a:extLst>
+                      <a:ext uri="{FF2B5EF4-FFF2-40B4-BE49-F238E27FC236}">
+                        <a16:creationId xmlns:a16="http://schemas.microsoft.com/office/drawing/2014/main" id="{7E5338C1-7C34-0A28-59B0-12735D42A3EF}"/>
+                      </a:ext>
+                    </a:extLst>
+                  </p:cNvPr>
+                  <p:cNvSpPr txBox="1">
+                    <a:spLocks noRot="1" noChangeAspect="1" noMove="1" noResize="1" noEditPoints="1" noAdjustHandles="1" noChangeArrowheads="1" noChangeShapeType="1" noTextEdit="1"/>
+                  </p:cNvSpPr>
+                  <p:nvPr/>
+                </p:nvSpPr>
+                <p:spPr>
+                  <a:xfrm>
+                    <a:off x="8177046" y="2503920"/>
+                    <a:ext cx="987973" cy="646331"/>
+                  </a:xfrm>
+                  <a:prstGeom prst="rect">
+                    <a:avLst/>
+                  </a:prstGeom>
+                  <a:blipFill>
+                    <a:blip r:embed="rId3"/>
+                    <a:stretch>
+                      <a:fillRect l="-19231" t="-15385" r="-21795" b="-32692"/>
+                    </a:stretch>
+                  </a:blipFill>
+                </p:spPr>
+                <p:txBody>
+                  <a:bodyPr/>
+                  <a:lstStyle/>
+                  <a:p>
+                    <a:r>
+                      <a:rPr lang="en-US">
+                        <a:noFill/>
+                      </a:rPr>
+                      <a:t> </a:t>
+                    </a:r>
+                  </a:p>
+                </p:txBody>
+              </p:sp>
+            </mc:Fallback>
+          </mc:AlternateContent>
+          <p:cxnSp>
+            <p:nvCxnSpPr>
+              <p:cNvPr id="18" name="Straight Arrow Connector 17">
+                <a:extLst>
+                  <a:ext uri="{FF2B5EF4-FFF2-40B4-BE49-F238E27FC236}">
+                    <a16:creationId xmlns:a16="http://schemas.microsoft.com/office/drawing/2014/main" id="{137A6BC3-E0E3-B011-335E-EBAA4F3640DA}"/>
+                  </a:ext>
+                </a:extLst>
+              </p:cNvPr>
+              <p:cNvCxnSpPr>
+                <a:cxnSpLocks/>
+              </p:cNvCxnSpPr>
+              <p:nvPr/>
+            </p:nvCxnSpPr>
+            <p:spPr>
+              <a:xfrm flipV="1">
+                <a:off x="2532994" y="2844698"/>
+                <a:ext cx="1282261" cy="6916"/>
+              </a:xfrm>
+              <a:prstGeom prst="straightConnector1">
+                <a:avLst/>
+              </a:prstGeom>
+              <a:ln w="76200">
+                <a:solidFill>
+                  <a:schemeClr val="bg1">
+                    <a:lumMod val="50000"/>
+                  </a:schemeClr>
+                </a:solidFill>
+                <a:tailEnd type="triangle"/>
+              </a:ln>
+            </p:spPr>
+            <p:style>
+              <a:lnRef idx="2">
+                <a:schemeClr val="accent1"/>
+              </a:lnRef>
+              <a:fillRef idx="0">
+                <a:schemeClr val="accent1"/>
+              </a:fillRef>
+              <a:effectRef idx="1">
+                <a:schemeClr val="accent1"/>
+              </a:effectRef>
+              <a:fontRef idx="minor">
+                <a:schemeClr val="tx1"/>
+              </a:fontRef>
+            </p:style>
+          </p:cxnSp>
+          <p:cxnSp>
+            <p:nvCxnSpPr>
+              <p:cNvPr id="19" name="Straight Arrow Connector 18">
+                <a:extLst>
+                  <a:ext uri="{FF2B5EF4-FFF2-40B4-BE49-F238E27FC236}">
+                    <a16:creationId xmlns:a16="http://schemas.microsoft.com/office/drawing/2014/main" id="{EC6C8ADA-CD46-4F26-1D94-A2F0E9576103}"/>
+                  </a:ext>
+                </a:extLst>
+              </p:cNvPr>
+              <p:cNvCxnSpPr>
+                <a:cxnSpLocks/>
+              </p:cNvCxnSpPr>
+              <p:nvPr/>
+            </p:nvCxnSpPr>
+            <p:spPr>
+              <a:xfrm flipV="1">
+                <a:off x="6894788" y="2829148"/>
+                <a:ext cx="1241212" cy="30938"/>
+              </a:xfrm>
+              <a:prstGeom prst="straightConnector1">
+                <a:avLst/>
+              </a:prstGeom>
+              <a:ln w="76200">
+                <a:solidFill>
+                  <a:schemeClr val="bg1">
+                    <a:lumMod val="50000"/>
+                  </a:schemeClr>
+                </a:solidFill>
+                <a:tailEnd type="triangle"/>
+              </a:ln>
+            </p:spPr>
+            <p:style>
+              <a:lnRef idx="2">
+                <a:schemeClr val="accent1"/>
+              </a:lnRef>
+              <a:fillRef idx="0">
+                <a:schemeClr val="accent1"/>
+              </a:fillRef>
+              <a:effectRef idx="1">
+                <a:schemeClr val="accent1"/>
+              </a:effectRef>
+              <a:fontRef idx="minor">
+                <a:schemeClr val="tx1"/>
+              </a:fontRef>
+            </p:style>
+          </p:cxnSp>
+        </p:grpSp>
+        <mc:AlternateContent xmlns:mc="http://schemas.openxmlformats.org/markup-compatibility/2006">
+          <mc:Choice xmlns:a14="http://schemas.microsoft.com/office/drawing/2010/main" Requires="a14">
+            <p:sp>
+              <p:nvSpPr>
+                <p:cNvPr id="21" name="TextBox 20">
+                  <a:extLst>
+                    <a:ext uri="{FF2B5EF4-FFF2-40B4-BE49-F238E27FC236}">
+                      <a16:creationId xmlns:a16="http://schemas.microsoft.com/office/drawing/2014/main" id="{2894E016-1DED-8934-5200-E9E093A7E0BC}"/>
+                    </a:ext>
+                  </a:extLst>
+                </p:cNvPr>
+                <p:cNvSpPr txBox="1"/>
+                <p:nvPr/>
+              </p:nvSpPr>
+              <p:spPr>
+                <a:xfrm>
+                  <a:off x="1776461" y="4668998"/>
+                  <a:ext cx="604333" cy="553998"/>
+                </a:xfrm>
+                <a:prstGeom prst="rect">
+                  <a:avLst/>
+                </a:prstGeom>
+                <a:noFill/>
+              </p:spPr>
+              <p:txBody>
+                <a:bodyPr wrap="none" lIns="0" tIns="0" rIns="0" bIns="0" rtlCol="0">
+                  <a:spAutoFit/>
+                </a:bodyPr>
+                <a:lstStyle/>
+                <a:p>
+                  <a14:m>
+                    <m:oMathPara xmlns:m="http://schemas.openxmlformats.org/officeDocument/2006/math">
+                      <m:oMathParaPr>
+                        <m:jc m:val="centerGroup"/>
+                      </m:oMathParaPr>
+                      <m:oMath xmlns:m="http://schemas.openxmlformats.org/officeDocument/2006/math">
+                        <m:r>
+                          <a:rPr lang="en-US" sz="3600" b="0" i="1" smtClean="0">
+                            <a:latin typeface="Cambria Math" panose="02040503050406030204" pitchFamily="18" charset="0"/>
+                          </a:rPr>
+                          <m:t>70</m:t>
+                        </m:r>
+                      </m:oMath>
+                    </m:oMathPara>
+                  </a14:m>
+                  <a:endParaRPr lang="en-US" sz="3600" dirty="0"/>
+                </a:p>
+              </p:txBody>
+            </p:sp>
+          </mc:Choice>
+          <mc:Fallback>
+            <p:sp>
+              <p:nvSpPr>
+                <p:cNvPr id="21" name="TextBox 20">
+                  <a:extLst>
+                    <a:ext uri="{FF2B5EF4-FFF2-40B4-BE49-F238E27FC236}">
+                      <a16:creationId xmlns:a16="http://schemas.microsoft.com/office/drawing/2014/main" id="{2894E016-1DED-8934-5200-E9E093A7E0BC}"/>
+                    </a:ext>
+                  </a:extLst>
+                </p:cNvPr>
+                <p:cNvSpPr txBox="1">
+                  <a:spLocks noRot="1" noChangeAspect="1" noMove="1" noResize="1" noEditPoints="1" noAdjustHandles="1" noChangeArrowheads="1" noChangeShapeType="1" noTextEdit="1"/>
+                </p:cNvSpPr>
+                <p:nvPr/>
+              </p:nvSpPr>
+              <p:spPr>
+                <a:xfrm>
+                  <a:off x="1776461" y="4668998"/>
+                  <a:ext cx="604333" cy="553998"/>
+                </a:xfrm>
+                <a:prstGeom prst="rect">
+                  <a:avLst/>
+                </a:prstGeom>
+                <a:blipFill>
+                  <a:blip r:embed="rId4"/>
+                  <a:stretch>
+                    <a:fillRect l="-16327" r="-16327" b="-2222"/>
+                  </a:stretch>
+                </a:blipFill>
+              </p:spPr>
+              <p:txBody>
+                <a:bodyPr/>
+                <a:lstStyle/>
+                <a:p>
+                  <a:r>
+                    <a:rPr lang="en-US">
+                      <a:noFill/>
+                    </a:rPr>
+                    <a:t> </a:t>
+                  </a:r>
+                </a:p>
+              </p:txBody>
+            </p:sp>
+          </mc:Fallback>
+        </mc:AlternateContent>
+      </p:grpSp>
+      <p:grpSp>
+        <p:nvGrpSpPr>
+          <p:cNvPr id="28" name="Group 27">
+            <a:extLst>
+              <a:ext uri="{FF2B5EF4-FFF2-40B4-BE49-F238E27FC236}">
+                <a16:creationId xmlns:a16="http://schemas.microsoft.com/office/drawing/2014/main" id="{E6131264-CD0A-08D7-1D35-652C809C006B}"/>
+              </a:ext>
+            </a:extLst>
+          </p:cNvPr>
+          <p:cNvGrpSpPr/>
+          <p:nvPr/>
+        </p:nvGrpSpPr>
+        <p:grpSpPr>
+          <a:xfrm>
+            <a:off x="577144" y="2658456"/>
+            <a:ext cx="9427837" cy="1261241"/>
+            <a:chOff x="-499301" y="2658456"/>
+            <a:chExt cx="9427837" cy="1261241"/>
+          </a:xfrm>
+        </p:grpSpPr>
+        <p:grpSp>
+          <p:nvGrpSpPr>
+            <p:cNvPr id="22" name="Group 21">
+              <a:extLst>
+                <a:ext uri="{FF2B5EF4-FFF2-40B4-BE49-F238E27FC236}">
+                  <a16:creationId xmlns:a16="http://schemas.microsoft.com/office/drawing/2014/main" id="{F47366C1-EC5E-12C4-D6B9-22B078CF8813}"/>
+                </a:ext>
+              </a:extLst>
+            </p:cNvPr>
+            <p:cNvGrpSpPr/>
+            <p:nvPr/>
+          </p:nvGrpSpPr>
+          <p:grpSpPr>
+            <a:xfrm>
+              <a:off x="2296511" y="2658456"/>
+              <a:ext cx="6632025" cy="1261241"/>
+              <a:chOff x="2532994" y="2229466"/>
+              <a:chExt cx="6632025" cy="1261241"/>
+            </a:xfrm>
+          </p:grpSpPr>
+          <mc:AlternateContent xmlns:mc="http://schemas.openxmlformats.org/markup-compatibility/2006">
+            <mc:Choice xmlns:a14="http://schemas.microsoft.com/office/drawing/2010/main" Requires="a14">
+              <p:sp>
+                <p:nvSpPr>
+                  <p:cNvPr id="23" name="Rectangle 22">
+                    <a:extLst>
+                      <a:ext uri="{FF2B5EF4-FFF2-40B4-BE49-F238E27FC236}">
+                        <a16:creationId xmlns:a16="http://schemas.microsoft.com/office/drawing/2014/main" id="{108CA430-570E-D900-4294-58E99DC0CA5F}"/>
+                      </a:ext>
+                    </a:extLst>
+                  </p:cNvPr>
+                  <p:cNvSpPr/>
+                  <p:nvPr/>
+                </p:nvSpPr>
+                <p:spPr>
+                  <a:xfrm>
+                    <a:off x="3815255" y="2229466"/>
+                    <a:ext cx="3079533" cy="1261241"/>
+                  </a:xfrm>
+                  <a:prstGeom prst="rect">
+                    <a:avLst/>
+                  </a:prstGeom>
+                  <a:ln w="38100">
+                    <a:solidFill>
+                      <a:schemeClr val="tx1"/>
+                    </a:solidFill>
+                  </a:ln>
+                </p:spPr>
+                <p:style>
+                  <a:lnRef idx="2">
+                    <a:schemeClr val="accent6"/>
+                  </a:lnRef>
+                  <a:fillRef idx="1">
+                    <a:schemeClr val="lt1"/>
+                  </a:fillRef>
+                  <a:effectRef idx="0">
+                    <a:schemeClr val="accent6"/>
+                  </a:effectRef>
+                  <a:fontRef idx="minor">
+                    <a:schemeClr val="dk1"/>
+                  </a:fontRef>
+                </p:style>
+                <p:txBody>
+                  <a:bodyPr rtlCol="0" anchor="ctr"/>
+                  <a:lstStyle/>
+                  <a:p>
+                    <a:pPr algn="ctr"/>
+                    <a14:m>
+                      <m:oMathPara xmlns:m="http://schemas.openxmlformats.org/officeDocument/2006/math">
+                        <m:oMathParaPr>
+                          <m:jc m:val="centerGroup"/>
+                        </m:oMathParaPr>
+                        <m:oMath xmlns:m="http://schemas.openxmlformats.org/officeDocument/2006/math">
+                          <m:r>
+                            <a:rPr lang="en-US" sz="3200" b="0" i="1" smtClean="0">
+                              <a:latin typeface="Cambria Math" panose="02040503050406030204" pitchFamily="18" charset="0"/>
+                            </a:rPr>
+                            <m:t>𝑎</m:t>
+                          </m:r>
+                          <m:r>
+                            <a:rPr lang="en-US" sz="3200" b="0" i="1" smtClean="0">
+                              <a:latin typeface="Cambria Math" panose="02040503050406030204" pitchFamily="18" charset="0"/>
+                            </a:rPr>
+                            <m:t>+</m:t>
+                          </m:r>
+                          <m:r>
+                            <a:rPr lang="en-US" sz="3200" b="0" i="1" smtClean="0">
+                              <a:latin typeface="Cambria Math" panose="02040503050406030204" pitchFamily="18" charset="0"/>
+                            </a:rPr>
+                            <m:t>𝑏</m:t>
+                          </m:r>
+                          <m:r>
+                            <a:rPr lang="en-US" sz="3200" b="0" i="1" smtClean="0">
+                              <a:latin typeface="Cambria Math" panose="02040503050406030204" pitchFamily="18" charset="0"/>
+                            </a:rPr>
+                            <m:t>∗</m:t>
+                          </m:r>
+                          <m:r>
+                            <a:rPr lang="en-US" sz="3200" b="0" i="1" smtClean="0">
+                              <a:latin typeface="Cambria Math" panose="02040503050406030204" pitchFamily="18" charset="0"/>
+                            </a:rPr>
+                            <m:t>𝑡</m:t>
+                          </m:r>
+                        </m:oMath>
+                      </m:oMathPara>
+                    </a14:m>
+                    <a:endParaRPr lang="en-US" sz="3200" dirty="0"/>
+                  </a:p>
+                </p:txBody>
+              </p:sp>
+            </mc:Choice>
+            <mc:Fallback>
+              <p:sp>
+                <p:nvSpPr>
+                  <p:cNvPr id="23" name="Rectangle 22">
+                    <a:extLst>
+                      <a:ext uri="{FF2B5EF4-FFF2-40B4-BE49-F238E27FC236}">
+                        <a16:creationId xmlns:a16="http://schemas.microsoft.com/office/drawing/2014/main" id="{108CA430-570E-D900-4294-58E99DC0CA5F}"/>
+                      </a:ext>
+                    </a:extLst>
+                  </p:cNvPr>
+                  <p:cNvSpPr>
+                    <a:spLocks noRot="1" noChangeAspect="1" noMove="1" noResize="1" noEditPoints="1" noAdjustHandles="1" noChangeArrowheads="1" noChangeShapeType="1" noTextEdit="1"/>
+                  </p:cNvSpPr>
+                  <p:nvPr/>
+                </p:nvSpPr>
+                <p:spPr>
+                  <a:xfrm>
+                    <a:off x="3815255" y="2229466"/>
+                    <a:ext cx="3079533" cy="1261241"/>
+                  </a:xfrm>
+                  <a:prstGeom prst="rect">
+                    <a:avLst/>
+                  </a:prstGeom>
+                  <a:blipFill>
+                    <a:blip r:embed="rId5"/>
+                    <a:stretch>
+                      <a:fillRect/>
+                    </a:stretch>
+                  </a:blipFill>
+                  <a:ln w="38100">
+                    <a:solidFill>
+                      <a:schemeClr val="tx1"/>
+                    </a:solidFill>
+                  </a:ln>
+                </p:spPr>
+                <p:txBody>
+                  <a:bodyPr/>
+                  <a:lstStyle/>
+                  <a:p>
+                    <a:r>
+                      <a:rPr lang="en-US">
+                        <a:noFill/>
+                      </a:rPr>
+                      <a:t> </a:t>
+                    </a:r>
+                  </a:p>
+                </p:txBody>
+              </p:sp>
+            </mc:Fallback>
+          </mc:AlternateContent>
+          <mc:AlternateContent xmlns:mc="http://schemas.openxmlformats.org/markup-compatibility/2006">
+            <mc:Choice xmlns:a14="http://schemas.microsoft.com/office/drawing/2010/main" Requires="a14">
+              <p:sp>
+                <p:nvSpPr>
+                  <p:cNvPr id="24" name="TextBox 23">
+                    <a:extLst>
+                      <a:ext uri="{FF2B5EF4-FFF2-40B4-BE49-F238E27FC236}">
+                        <a16:creationId xmlns:a16="http://schemas.microsoft.com/office/drawing/2014/main" id="{AF17F315-0772-B4CF-DECC-8C2B4727AFF6}"/>
+                      </a:ext>
+                    </a:extLst>
+                  </p:cNvPr>
+                  <p:cNvSpPr txBox="1"/>
+                  <p:nvPr/>
+                </p:nvSpPr>
+                <p:spPr>
+                  <a:xfrm>
+                    <a:off x="8177046" y="2503920"/>
+                    <a:ext cx="987973" cy="646331"/>
+                  </a:xfrm>
+                  <a:prstGeom prst="rect">
+                    <a:avLst/>
+                  </a:prstGeom>
+                  <a:noFill/>
+                </p:spPr>
+                <p:txBody>
+                  <a:bodyPr wrap="square" rtlCol="0">
+                    <a:spAutoFit/>
+                  </a:bodyPr>
+                  <a:lstStyle/>
+                  <a:p>
+                    <a14:m>
+                      <m:oMathPara xmlns:m="http://schemas.openxmlformats.org/officeDocument/2006/math">
+                        <m:oMathParaPr>
+                          <m:jc m:val="centerGroup"/>
+                        </m:oMathParaPr>
+                        <m:oMath xmlns:m="http://schemas.openxmlformats.org/officeDocument/2006/math">
+                          <m:acc>
+                            <m:accPr>
+                              <m:chr m:val="̂"/>
+                              <m:ctrlPr>
+                                <a:rPr lang="en-US" sz="3600" i="1" dirty="0" smtClean="0">
+                                  <a:latin typeface="Cambria Math" panose="02040503050406030204" pitchFamily="18" charset="0"/>
+                                </a:rPr>
+                              </m:ctrlPr>
+                            </m:accPr>
+                            <m:e>
+                              <m:r>
+                                <a:rPr lang="en-US" sz="3600" b="0" i="1" dirty="0" smtClean="0">
+                                  <a:latin typeface="Cambria Math" panose="02040503050406030204" pitchFamily="18" charset="0"/>
+                                </a:rPr>
+                                <m:t>𝑐𝑢𝑠𝑡𝑜𝑚𝑒𝑟𝑠</m:t>
+                              </m:r>
+                            </m:e>
+                          </m:acc>
+                        </m:oMath>
+                      </m:oMathPara>
+                    </a14:m>
+                  </a:p>
+                </p:txBody>
+              </p:sp>
+            </mc:Choice>
+            <mc:Fallback>
+              <p:sp>
+                <p:nvSpPr>
+                  <p:cNvPr id="24" name="TextBox 23">
+                    <a:extLst>
+                      <a:ext uri="{FF2B5EF4-FFF2-40B4-BE49-F238E27FC236}">
+                        <a16:creationId xmlns:a16="http://schemas.microsoft.com/office/drawing/2014/main" id="{AF17F315-0772-B4CF-DECC-8C2B4727AFF6}"/>
+                      </a:ext>
+                    </a:extLst>
+                  </p:cNvPr>
+                  <p:cNvSpPr txBox="1">
+                    <a:spLocks noRot="1" noChangeAspect="1" noMove="1" noResize="1" noEditPoints="1" noAdjustHandles="1" noChangeArrowheads="1" noChangeShapeType="1" noTextEdit="1"/>
+                  </p:cNvSpPr>
+                  <p:nvPr/>
+                </p:nvSpPr>
+                <p:spPr>
+                  <a:xfrm>
+                    <a:off x="8177046" y="2503920"/>
+                    <a:ext cx="987973" cy="646331"/>
+                  </a:xfrm>
+                  <a:prstGeom prst="rect">
+                    <a:avLst/>
+                  </a:prstGeom>
+                  <a:blipFill>
+                    <a:blip r:embed="rId6"/>
+                    <a:stretch>
+                      <a:fillRect l="-3797" t="-15385" r="-163291" b="-36538"/>
+                    </a:stretch>
+                  </a:blipFill>
+                </p:spPr>
+                <p:txBody>
+                  <a:bodyPr/>
+                  <a:lstStyle/>
+                  <a:p>
+                    <a:r>
+                      <a:rPr lang="en-US">
+                        <a:noFill/>
+                      </a:rPr>
+                      <a:t> </a:t>
+                    </a:r>
+                  </a:p>
+                </p:txBody>
+              </p:sp>
+            </mc:Fallback>
+          </mc:AlternateContent>
+          <p:cxnSp>
+            <p:nvCxnSpPr>
+              <p:cNvPr id="25" name="Straight Arrow Connector 24">
+                <a:extLst>
+                  <a:ext uri="{FF2B5EF4-FFF2-40B4-BE49-F238E27FC236}">
+                    <a16:creationId xmlns:a16="http://schemas.microsoft.com/office/drawing/2014/main" id="{4D6829DA-4215-60DB-9C36-E4B4EE0E13EA}"/>
+                  </a:ext>
+                </a:extLst>
+              </p:cNvPr>
+              <p:cNvCxnSpPr>
+                <a:cxnSpLocks/>
+              </p:cNvCxnSpPr>
+              <p:nvPr/>
+            </p:nvCxnSpPr>
+            <p:spPr>
+              <a:xfrm flipV="1">
+                <a:off x="2532994" y="2844698"/>
+                <a:ext cx="1282261" cy="6916"/>
+              </a:xfrm>
+              <a:prstGeom prst="straightConnector1">
+                <a:avLst/>
+              </a:prstGeom>
+              <a:ln w="76200">
+                <a:solidFill>
+                  <a:schemeClr val="bg1">
+                    <a:lumMod val="50000"/>
+                  </a:schemeClr>
+                </a:solidFill>
+                <a:tailEnd type="triangle"/>
+              </a:ln>
+            </p:spPr>
+            <p:style>
+              <a:lnRef idx="2">
+                <a:schemeClr val="accent1"/>
+              </a:lnRef>
+              <a:fillRef idx="0">
+                <a:schemeClr val="accent1"/>
+              </a:fillRef>
+              <a:effectRef idx="1">
+                <a:schemeClr val="accent1"/>
+              </a:effectRef>
+              <a:fontRef idx="minor">
+                <a:schemeClr val="tx1"/>
+              </a:fontRef>
+            </p:style>
+          </p:cxnSp>
+          <p:cxnSp>
+            <p:nvCxnSpPr>
+              <p:cNvPr id="26" name="Straight Arrow Connector 25">
+                <a:extLst>
+                  <a:ext uri="{FF2B5EF4-FFF2-40B4-BE49-F238E27FC236}">
+                    <a16:creationId xmlns:a16="http://schemas.microsoft.com/office/drawing/2014/main" id="{EDA9B41D-7F01-8B25-E5B3-51477B0EDB78}"/>
+                  </a:ext>
+                </a:extLst>
+              </p:cNvPr>
+              <p:cNvCxnSpPr>
+                <a:cxnSpLocks/>
+              </p:cNvCxnSpPr>
+              <p:nvPr/>
+            </p:nvCxnSpPr>
+            <p:spPr>
+              <a:xfrm flipV="1">
+                <a:off x="6894788" y="2829148"/>
+                <a:ext cx="1241212" cy="30938"/>
+              </a:xfrm>
+              <a:prstGeom prst="straightConnector1">
+                <a:avLst/>
+              </a:prstGeom>
+              <a:ln w="76200">
+                <a:solidFill>
+                  <a:schemeClr val="bg1">
+                    <a:lumMod val="50000"/>
+                  </a:schemeClr>
+                </a:solidFill>
+                <a:tailEnd type="triangle"/>
+              </a:ln>
+            </p:spPr>
+            <p:style>
+              <a:lnRef idx="2">
+                <a:schemeClr val="accent1"/>
+              </a:lnRef>
+              <a:fillRef idx="0">
+                <a:schemeClr val="accent1"/>
+              </a:fillRef>
+              <a:effectRef idx="1">
+                <a:schemeClr val="accent1"/>
+              </a:effectRef>
+              <a:fontRef idx="minor">
+                <a:schemeClr val="tx1"/>
+              </a:fontRef>
+            </p:style>
+          </p:cxnSp>
+        </p:grpSp>
+        <mc:AlternateContent xmlns:mc="http://schemas.openxmlformats.org/markup-compatibility/2006">
+          <mc:Choice xmlns:a14="http://schemas.microsoft.com/office/drawing/2010/main" Requires="a14">
+            <p:sp>
+              <p:nvSpPr>
+                <p:cNvPr id="27" name="TextBox 26">
+                  <a:extLst>
+                    <a:ext uri="{FF2B5EF4-FFF2-40B4-BE49-F238E27FC236}">
+                      <a16:creationId xmlns:a16="http://schemas.microsoft.com/office/drawing/2014/main" id="{7F07CC57-8E13-7016-C90F-02EBF5249DB9}"/>
+                    </a:ext>
+                  </a:extLst>
+                </p:cNvPr>
+                <p:cNvSpPr txBox="1"/>
+                <p:nvPr/>
+              </p:nvSpPr>
+              <p:spPr>
+                <a:xfrm>
+                  <a:off x="-499301" y="2971940"/>
+                  <a:ext cx="2762488" cy="553998"/>
+                </a:xfrm>
+                <a:prstGeom prst="rect">
+                  <a:avLst/>
+                </a:prstGeom>
+                <a:noFill/>
+              </p:spPr>
+              <p:txBody>
+                <a:bodyPr wrap="none" lIns="0" tIns="0" rIns="0" bIns="0" rtlCol="0">
+                  <a:spAutoFit/>
+                </a:bodyPr>
+                <a:lstStyle/>
+                <a:p>
+                  <a14:m>
+                    <m:oMathPara xmlns:m="http://schemas.openxmlformats.org/officeDocument/2006/math">
+                      <m:oMathParaPr>
+                        <m:jc m:val="centerGroup"/>
+                      </m:oMathParaPr>
+                      <m:oMath xmlns:m="http://schemas.openxmlformats.org/officeDocument/2006/math">
+                        <m:r>
+                          <a:rPr lang="en-US" sz="3600" b="0" i="1" smtClean="0">
+                            <a:latin typeface="Cambria Math" panose="02040503050406030204" pitchFamily="18" charset="0"/>
+                          </a:rPr>
+                          <m:t>𝑡𝑒𝑚𝑝𝑒𝑟𝑎𝑡𝑢𝑟𝑒</m:t>
+                        </m:r>
+                      </m:oMath>
+                    </m:oMathPara>
+                  </a14:m>
+                  <a:endParaRPr lang="en-US" sz="3600" dirty="0"/>
+                </a:p>
+              </p:txBody>
+            </p:sp>
+          </mc:Choice>
+          <mc:Fallback>
+            <p:sp>
+              <p:nvSpPr>
+                <p:cNvPr id="27" name="TextBox 26">
+                  <a:extLst>
+                    <a:ext uri="{FF2B5EF4-FFF2-40B4-BE49-F238E27FC236}">
+                      <a16:creationId xmlns:a16="http://schemas.microsoft.com/office/drawing/2014/main" id="{7F07CC57-8E13-7016-C90F-02EBF5249DB9}"/>
+                    </a:ext>
+                  </a:extLst>
+                </p:cNvPr>
+                <p:cNvSpPr txBox="1">
+                  <a:spLocks noRot="1" noChangeAspect="1" noMove="1" noResize="1" noEditPoints="1" noAdjustHandles="1" noChangeArrowheads="1" noChangeShapeType="1" noTextEdit="1"/>
+                </p:cNvSpPr>
+                <p:nvPr/>
+              </p:nvSpPr>
+              <p:spPr>
+                <a:xfrm>
+                  <a:off x="-499301" y="2971940"/>
+                  <a:ext cx="2762488" cy="553998"/>
+                </a:xfrm>
+                <a:prstGeom prst="rect">
+                  <a:avLst/>
+                </a:prstGeom>
+                <a:blipFill>
+                  <a:blip r:embed="rId7"/>
+                  <a:stretch>
+                    <a:fillRect l="-4566" r="-4110" b="-27273"/>
+                  </a:stretch>
+                </a:blipFill>
+              </p:spPr>
+              <p:txBody>
+                <a:bodyPr/>
+                <a:lstStyle/>
+                <a:p>
+                  <a:r>
+                    <a:rPr lang="en-US">
+                      <a:noFill/>
+                    </a:rPr>
+                    <a:t> </a:t>
+                  </a:r>
+                </a:p>
+              </p:txBody>
+            </p:sp>
+          </mc:Fallback>
+        </mc:AlternateContent>
+      </p:grpSp>
+    </p:spTree>
+    <p:extLst>
+      <p:ext uri="{BB962C8B-B14F-4D97-AF65-F5344CB8AC3E}">
+        <p14:creationId xmlns:p14="http://schemas.microsoft.com/office/powerpoint/2010/main" val="911215209"/>
+      </p:ext>
+    </p:extLst>
+  </p:cSld>
+  <p:clrMapOvr>
+    <a:masterClrMapping/>
+  </p:clrMapOvr>
+</p:sld>
+</file>
+
+<file path=ppt/slides/slide9.xml><?xml version="1.0" encoding="utf-8"?>
+<p:sld xmlns:a="http://schemas.openxmlformats.org/drawingml/2006/main" xmlns:r="http://schemas.openxmlformats.org/officeDocument/2006/relationships" xmlns:p="http://schemas.openxmlformats.org/presentationml/2006/main">
+  <p:cSld>
+    <p:spTree>
+      <p:nvGrpSpPr>
+        <p:cNvPr id="1" name=""/>
+        <p:cNvGrpSpPr/>
+        <p:nvPr/>
+      </p:nvGrpSpPr>
+      <p:grpSpPr>
+        <a:xfrm>
+          <a:off x="0" y="0"/>
+          <a:ext cx="0" cy="0"/>
+          <a:chOff x="0" y="0"/>
+          <a:chExt cx="0" cy="0"/>
+        </a:xfrm>
+      </p:grpSpPr>
+      <p:grpSp>
+        <p:nvGrpSpPr>
+          <p:cNvPr id="8" name="Group 7">
+            <a:extLst>
+              <a:ext uri="{FF2B5EF4-FFF2-40B4-BE49-F238E27FC236}">
+                <a16:creationId xmlns:a16="http://schemas.microsoft.com/office/drawing/2014/main" id="{73BA78C6-0A1C-4CB9-96AB-A54F44A6E764}"/>
+              </a:ext>
+            </a:extLst>
+          </p:cNvPr>
+          <p:cNvGrpSpPr/>
+          <p:nvPr/>
+        </p:nvGrpSpPr>
+        <p:grpSpPr>
+          <a:xfrm>
+            <a:off x="1680209" y="2446504"/>
+            <a:ext cx="7251924" cy="1261241"/>
+            <a:chOff x="1680209" y="2446504"/>
+            <a:chExt cx="7251924" cy="1261241"/>
+          </a:xfrm>
+        </p:grpSpPr>
+        <p:grpSp>
+          <p:nvGrpSpPr>
+            <p:cNvPr id="2" name="Group 1">
+              <a:extLst>
+                <a:ext uri="{FF2B5EF4-FFF2-40B4-BE49-F238E27FC236}">
+                  <a16:creationId xmlns:a16="http://schemas.microsoft.com/office/drawing/2014/main" id="{4CBF2273-C976-0C60-837B-46E1628716EE}"/>
+                </a:ext>
+              </a:extLst>
+            </p:cNvPr>
+            <p:cNvGrpSpPr/>
+            <p:nvPr/>
+          </p:nvGrpSpPr>
+          <p:grpSpPr>
+            <a:xfrm>
+              <a:off x="2300108" y="2446504"/>
+              <a:ext cx="6632025" cy="1261241"/>
+              <a:chOff x="2532994" y="2229466"/>
+              <a:chExt cx="6632025" cy="1261241"/>
+            </a:xfrm>
+          </p:grpSpPr>
+          <mc:AlternateContent xmlns:mc="http://schemas.openxmlformats.org/markup-compatibility/2006">
+            <mc:Choice xmlns:a14="http://schemas.microsoft.com/office/drawing/2010/main" Requires="a14">
+              <p:sp>
+                <p:nvSpPr>
+                  <p:cNvPr id="3" name="Rectangle 2">
+                    <a:extLst>
+                      <a:ext uri="{FF2B5EF4-FFF2-40B4-BE49-F238E27FC236}">
+                        <a16:creationId xmlns:a16="http://schemas.microsoft.com/office/drawing/2014/main" id="{084818F6-C7C0-5DF1-F745-47E963919782}"/>
+                      </a:ext>
+                    </a:extLst>
+                  </p:cNvPr>
+                  <p:cNvSpPr/>
+                  <p:nvPr/>
+                </p:nvSpPr>
+                <p:spPr>
+                  <a:xfrm>
+                    <a:off x="3815255" y="2229466"/>
+                    <a:ext cx="3079533" cy="1261241"/>
+                  </a:xfrm>
+                  <a:prstGeom prst="rect">
+                    <a:avLst/>
+                  </a:prstGeom>
+                  <a:ln w="38100">
+                    <a:solidFill>
+                      <a:schemeClr val="tx1"/>
+                    </a:solidFill>
+                  </a:ln>
+                </p:spPr>
+                <p:style>
+                  <a:lnRef idx="2">
+                    <a:schemeClr val="accent6"/>
+                  </a:lnRef>
+                  <a:fillRef idx="1">
+                    <a:schemeClr val="lt1"/>
+                  </a:fillRef>
+                  <a:effectRef idx="0">
+                    <a:schemeClr val="accent6"/>
+                  </a:effectRef>
+                  <a:fontRef idx="minor">
+                    <a:schemeClr val="dk1"/>
+                  </a:fontRef>
+                </p:style>
+                <p:txBody>
+                  <a:bodyPr rtlCol="0" anchor="ctr"/>
+                  <a:lstStyle/>
+                  <a:p>
+                    <a:pPr algn="ctr"/>
+                    <a14:m>
+                      <m:oMathPara xmlns:m="http://schemas.openxmlformats.org/officeDocument/2006/math">
+                        <m:oMathParaPr>
+                          <m:jc m:val="centerGroup"/>
+                        </m:oMathParaPr>
+                        <m:oMath xmlns:m="http://schemas.openxmlformats.org/officeDocument/2006/math">
+                          <m:r>
+                            <a:rPr lang="en-US" sz="3200" i="1" smtClean="0">
+                              <a:latin typeface="Cambria Math" panose="02040503050406030204" pitchFamily="18" charset="0"/>
+                            </a:rPr>
+                            <m:t>2</m:t>
+                          </m:r>
+                          <m:r>
+                            <a:rPr lang="en-US" sz="3200" b="0" i="1" smtClean="0">
+                              <a:latin typeface="Cambria Math" panose="02040503050406030204" pitchFamily="18" charset="0"/>
+                            </a:rPr>
+                            <m:t>2.06</m:t>
+                          </m:r>
+                          <m:r>
+                            <a:rPr lang="en-US" sz="3200" b="0" i="1" smtClean="0">
+                              <a:latin typeface="Cambria Math" panose="02040503050406030204" pitchFamily="18" charset="0"/>
+                            </a:rPr>
+                            <m:t>+1.42</m:t>
+                          </m:r>
+                          <m:r>
+                            <a:rPr lang="en-US" sz="3200" b="0" i="1" smtClean="0">
+                              <a:latin typeface="Cambria Math" panose="02040503050406030204" pitchFamily="18" charset="0"/>
+                            </a:rPr>
+                            <m:t>𝑡</m:t>
+                          </m:r>
+                        </m:oMath>
+                      </m:oMathPara>
+                    </a14:m>
+                    <a:endParaRPr lang="en-US" sz="3200" dirty="0"/>
+                  </a:p>
+                </p:txBody>
+              </p:sp>
+            </mc:Choice>
+            <mc:Fallback>
+              <p:sp>
+                <p:nvSpPr>
+                  <p:cNvPr id="3" name="Rectangle 2">
+                    <a:extLst>
+                      <a:ext uri="{FF2B5EF4-FFF2-40B4-BE49-F238E27FC236}">
+                        <a16:creationId xmlns:a16="http://schemas.microsoft.com/office/drawing/2014/main" id="{084818F6-C7C0-5DF1-F745-47E963919782}"/>
+                      </a:ext>
+                    </a:extLst>
+                  </p:cNvPr>
+                  <p:cNvSpPr>
+                    <a:spLocks noRot="1" noChangeAspect="1" noMove="1" noResize="1" noEditPoints="1" noAdjustHandles="1" noChangeArrowheads="1" noChangeShapeType="1" noTextEdit="1"/>
+                  </p:cNvSpPr>
+                  <p:nvPr/>
+                </p:nvSpPr>
+                <p:spPr>
+                  <a:xfrm>
+                    <a:off x="3815255" y="2229466"/>
+                    <a:ext cx="3079533" cy="1261241"/>
+                  </a:xfrm>
+                  <a:prstGeom prst="rect">
+                    <a:avLst/>
+                  </a:prstGeom>
+                  <a:blipFill>
+                    <a:blip r:embed="rId2"/>
+                    <a:stretch>
+                      <a:fillRect/>
+                    </a:stretch>
+                  </a:blipFill>
+                  <a:ln w="38100">
+                    <a:solidFill>
+                      <a:schemeClr val="tx1"/>
+                    </a:solidFill>
+                  </a:ln>
+                </p:spPr>
+                <p:txBody>
+                  <a:bodyPr/>
+                  <a:lstStyle/>
+                  <a:p>
+                    <a:r>
+                      <a:rPr lang="en-US">
+                        <a:noFill/>
+                      </a:rPr>
+                      <a:t> </a:t>
+                    </a:r>
+                  </a:p>
+                </p:txBody>
+              </p:sp>
+            </mc:Fallback>
+          </mc:AlternateContent>
+          <mc:AlternateContent xmlns:mc="http://schemas.openxmlformats.org/markup-compatibility/2006">
+            <mc:Choice xmlns:a14="http://schemas.microsoft.com/office/drawing/2010/main" Requires="a14">
+              <p:sp>
+                <p:nvSpPr>
+                  <p:cNvPr id="4" name="TextBox 3">
+                    <a:extLst>
+                      <a:ext uri="{FF2B5EF4-FFF2-40B4-BE49-F238E27FC236}">
+                        <a16:creationId xmlns:a16="http://schemas.microsoft.com/office/drawing/2014/main" id="{12B2922A-552F-4BA8-65F0-94F9A63B8B34}"/>
+                      </a:ext>
+                    </a:extLst>
+                  </p:cNvPr>
+                  <p:cNvSpPr txBox="1"/>
+                  <p:nvPr/>
+                </p:nvSpPr>
+                <p:spPr>
+                  <a:xfrm>
+                    <a:off x="8177046" y="2503920"/>
+                    <a:ext cx="987973" cy="646331"/>
+                  </a:xfrm>
+                  <a:prstGeom prst="rect">
+                    <a:avLst/>
+                  </a:prstGeom>
+                  <a:noFill/>
+                </p:spPr>
+                <p:txBody>
+                  <a:bodyPr wrap="square" rtlCol="0">
+                    <a:spAutoFit/>
+                  </a:bodyPr>
+                  <a:lstStyle/>
+                  <a:p>
+                    <a14:m>
+                      <m:oMathPara xmlns:m="http://schemas.openxmlformats.org/officeDocument/2006/math">
+                        <m:oMathParaPr>
+                          <m:jc m:val="centerGroup"/>
+                        </m:oMathParaPr>
+                        <m:oMath xmlns:m="http://schemas.openxmlformats.org/officeDocument/2006/math">
+                          <m:acc>
+                            <m:accPr>
+                              <m:chr m:val="̂"/>
+                              <m:ctrlPr>
+                                <a:rPr lang="en-US" sz="3600" i="1" dirty="0" smtClean="0">
+                                  <a:latin typeface="Cambria Math" panose="02040503050406030204" pitchFamily="18" charset="0"/>
+                                </a:rPr>
+                              </m:ctrlPr>
+                            </m:accPr>
+                            <m:e>
+                              <m:r>
+                                <a:rPr lang="en-US" sz="3600" b="0" i="1" dirty="0" smtClean="0">
+                                  <a:latin typeface="Cambria Math" panose="02040503050406030204" pitchFamily="18" charset="0"/>
+                                </a:rPr>
+                                <m:t>𝑐𝑢𝑠𝑡</m:t>
+                              </m:r>
+                            </m:e>
+                          </m:acc>
+                        </m:oMath>
+                      </m:oMathPara>
+                    </a14:m>
+                  </a:p>
+                </p:txBody>
+              </p:sp>
+            </mc:Choice>
+            <mc:Fallback>
+              <p:sp>
+                <p:nvSpPr>
+                  <p:cNvPr id="4" name="TextBox 3">
+                    <a:extLst>
+                      <a:ext uri="{FF2B5EF4-FFF2-40B4-BE49-F238E27FC236}">
+                        <a16:creationId xmlns:a16="http://schemas.microsoft.com/office/drawing/2014/main" id="{12B2922A-552F-4BA8-65F0-94F9A63B8B34}"/>
+                      </a:ext>
+                    </a:extLst>
+                  </p:cNvPr>
+                  <p:cNvSpPr txBox="1">
+                    <a:spLocks noRot="1" noChangeAspect="1" noMove="1" noResize="1" noEditPoints="1" noAdjustHandles="1" noChangeArrowheads="1" noChangeShapeType="1" noTextEdit="1"/>
+                  </p:cNvSpPr>
+                  <p:nvPr/>
+                </p:nvSpPr>
+                <p:spPr>
+                  <a:xfrm>
+                    <a:off x="8177046" y="2503920"/>
+                    <a:ext cx="987973" cy="646331"/>
+                  </a:xfrm>
+                  <a:prstGeom prst="rect">
+                    <a:avLst/>
+                  </a:prstGeom>
+                  <a:blipFill>
+                    <a:blip r:embed="rId3"/>
+                    <a:stretch>
+                      <a:fillRect l="-6329" t="-17647" r="-35443" b="-37255"/>
+                    </a:stretch>
+                  </a:blipFill>
+                </p:spPr>
+                <p:txBody>
+                  <a:bodyPr/>
+                  <a:lstStyle/>
+                  <a:p>
+                    <a:r>
+                      <a:rPr lang="en-US">
+                        <a:noFill/>
+                      </a:rPr>
+                      <a:t> </a:t>
+                    </a:r>
+                  </a:p>
+                </p:txBody>
+              </p:sp>
+            </mc:Fallback>
+          </mc:AlternateContent>
+          <p:cxnSp>
+            <p:nvCxnSpPr>
+              <p:cNvPr id="5" name="Straight Arrow Connector 4">
+                <a:extLst>
+                  <a:ext uri="{FF2B5EF4-FFF2-40B4-BE49-F238E27FC236}">
+                    <a16:creationId xmlns:a16="http://schemas.microsoft.com/office/drawing/2014/main" id="{6BFFB7FC-4CDE-D3CE-7D90-7676386C1C3B}"/>
+                  </a:ext>
+                </a:extLst>
+              </p:cNvPr>
+              <p:cNvCxnSpPr>
+                <a:cxnSpLocks/>
+              </p:cNvCxnSpPr>
+              <p:nvPr/>
+            </p:nvCxnSpPr>
+            <p:spPr>
+              <a:xfrm flipV="1">
+                <a:off x="2532994" y="2844698"/>
+                <a:ext cx="1282261" cy="6916"/>
+              </a:xfrm>
+              <a:prstGeom prst="straightConnector1">
+                <a:avLst/>
+              </a:prstGeom>
+              <a:ln w="76200">
+                <a:solidFill>
+                  <a:schemeClr val="bg1">
+                    <a:lumMod val="50000"/>
+                  </a:schemeClr>
+                </a:solidFill>
+                <a:tailEnd type="triangle"/>
+              </a:ln>
+            </p:spPr>
+            <p:style>
+              <a:lnRef idx="2">
+                <a:schemeClr val="accent1"/>
+              </a:lnRef>
+              <a:fillRef idx="0">
+                <a:schemeClr val="accent1"/>
+              </a:fillRef>
+              <a:effectRef idx="1">
+                <a:schemeClr val="accent1"/>
+              </a:effectRef>
+              <a:fontRef idx="minor">
+                <a:schemeClr val="tx1"/>
+              </a:fontRef>
+            </p:style>
+          </p:cxnSp>
+          <p:cxnSp>
+            <p:nvCxnSpPr>
+              <p:cNvPr id="6" name="Straight Arrow Connector 5">
+                <a:extLst>
+                  <a:ext uri="{FF2B5EF4-FFF2-40B4-BE49-F238E27FC236}">
+                    <a16:creationId xmlns:a16="http://schemas.microsoft.com/office/drawing/2014/main" id="{C16F0CE1-99D1-A444-B134-89A61D37EAA5}"/>
+                  </a:ext>
+                </a:extLst>
+              </p:cNvPr>
+              <p:cNvCxnSpPr>
+                <a:cxnSpLocks/>
+              </p:cNvCxnSpPr>
+              <p:nvPr/>
+            </p:nvCxnSpPr>
+            <p:spPr>
+              <a:xfrm flipV="1">
+                <a:off x="6894788" y="2829148"/>
+                <a:ext cx="1241212" cy="30938"/>
+              </a:xfrm>
+              <a:prstGeom prst="straightConnector1">
+                <a:avLst/>
+              </a:prstGeom>
+              <a:ln w="76200">
+                <a:solidFill>
+                  <a:schemeClr val="bg1">
+                    <a:lumMod val="50000"/>
+                  </a:schemeClr>
+                </a:solidFill>
+                <a:tailEnd type="triangle"/>
+              </a:ln>
+            </p:spPr>
+            <p:style>
+              <a:lnRef idx="2">
+                <a:schemeClr val="accent1"/>
+              </a:lnRef>
+              <a:fillRef idx="0">
+                <a:schemeClr val="accent1"/>
+              </a:fillRef>
+              <a:effectRef idx="1">
+                <a:schemeClr val="accent1"/>
+              </a:effectRef>
+              <a:fontRef idx="minor">
+                <a:schemeClr val="tx1"/>
+              </a:fontRef>
+            </p:style>
+          </p:cxnSp>
+        </p:grpSp>
+        <mc:AlternateContent xmlns:mc="http://schemas.openxmlformats.org/markup-compatibility/2006">
+          <mc:Choice xmlns:a14="http://schemas.microsoft.com/office/drawing/2010/main" Requires="a14">
+            <p:sp>
+              <p:nvSpPr>
+                <p:cNvPr id="7" name="TextBox 6">
+                  <a:extLst>
+                    <a:ext uri="{FF2B5EF4-FFF2-40B4-BE49-F238E27FC236}">
+                      <a16:creationId xmlns:a16="http://schemas.microsoft.com/office/drawing/2014/main" id="{2CF35532-8EBD-2090-F812-2C9BB9E4DB35}"/>
+                    </a:ext>
+                  </a:extLst>
+                </p:cNvPr>
+                <p:cNvSpPr txBox="1"/>
+                <p:nvPr/>
+              </p:nvSpPr>
+              <p:spPr>
+                <a:xfrm>
+                  <a:off x="1680209" y="2759988"/>
+                  <a:ext cx="288604" cy="553998"/>
+                </a:xfrm>
+                <a:prstGeom prst="rect">
+                  <a:avLst/>
+                </a:prstGeom>
+                <a:noFill/>
+              </p:spPr>
+              <p:txBody>
+                <a:bodyPr wrap="none" lIns="0" tIns="0" rIns="0" bIns="0" rtlCol="0">
+                  <a:spAutoFit/>
+                </a:bodyPr>
+                <a:lstStyle/>
+                <a:p>
+                  <a14:m>
+                    <m:oMathPara xmlns:m="http://schemas.openxmlformats.org/officeDocument/2006/math">
+                      <m:oMathParaPr>
+                        <m:jc m:val="centerGroup"/>
+                      </m:oMathParaPr>
+                      <m:oMath xmlns:m="http://schemas.openxmlformats.org/officeDocument/2006/math">
+                        <m:r>
+                          <a:rPr lang="en-US" sz="3600" b="0" i="1" smtClean="0">
+                            <a:latin typeface="Cambria Math" panose="02040503050406030204" pitchFamily="18" charset="0"/>
+                          </a:rPr>
+                          <m:t>𝑡</m:t>
+                        </m:r>
+                      </m:oMath>
+                    </m:oMathPara>
+                  </a14:m>
+                  <a:endParaRPr lang="en-US" sz="3600" dirty="0"/>
+                </a:p>
+              </p:txBody>
+            </p:sp>
+          </mc:Choice>
+          <mc:Fallback>
+            <p:sp>
+              <p:nvSpPr>
+                <p:cNvPr id="7" name="TextBox 6">
+                  <a:extLst>
+                    <a:ext uri="{FF2B5EF4-FFF2-40B4-BE49-F238E27FC236}">
+                      <a16:creationId xmlns:a16="http://schemas.microsoft.com/office/drawing/2014/main" id="{2CF35532-8EBD-2090-F812-2C9BB9E4DB35}"/>
+                    </a:ext>
+                  </a:extLst>
+                </p:cNvPr>
+                <p:cNvSpPr txBox="1">
+                  <a:spLocks noRot="1" noChangeAspect="1" noMove="1" noResize="1" noEditPoints="1" noAdjustHandles="1" noChangeArrowheads="1" noChangeShapeType="1" noTextEdit="1"/>
+                </p:cNvSpPr>
+                <p:nvPr/>
+              </p:nvSpPr>
+              <p:spPr>
+                <a:xfrm>
+                  <a:off x="1680209" y="2759988"/>
+                  <a:ext cx="288604" cy="553998"/>
+                </a:xfrm>
+                <a:prstGeom prst="rect">
+                  <a:avLst/>
+                </a:prstGeom>
+                <a:blipFill>
+                  <a:blip r:embed="rId4"/>
+                  <a:stretch>
+                    <a:fillRect l="-29167" r="-20833"/>
+                  </a:stretch>
+                </a:blipFill>
+              </p:spPr>
+              <p:txBody>
+                <a:bodyPr/>
+                <a:lstStyle/>
+                <a:p>
+                  <a:r>
+                    <a:rPr lang="en-US">
+                      <a:noFill/>
+                    </a:rPr>
+                    <a:t> </a:t>
+                  </a:r>
+                </a:p>
+              </p:txBody>
+            </p:sp>
+          </mc:Fallback>
+        </mc:AlternateContent>
+      </p:grpSp>
+    </p:spTree>
+    <p:extLst>
+      <p:ext uri="{BB962C8B-B14F-4D97-AF65-F5344CB8AC3E}">
+        <p14:creationId xmlns:p14="http://schemas.microsoft.com/office/powerpoint/2010/main" val="1398332104"/>
       </p:ext>
     </p:extLst>
   </p:cSld>

</xml_diff>